<commit_message>
Added comments on which errors are raised for the constructor overload class
</commit_message>
<xml_diff>
--- a/presentation.pptx
+++ b/presentation.pptx
@@ -8,6 +8,11 @@
     <p:sldId id="256" r:id="rId2"/>
     <p:sldId id="257" r:id="rId3"/>
     <p:sldId id="258" r:id="rId4"/>
+    <p:sldId id="259" r:id="rId5"/>
+    <p:sldId id="262" r:id="rId6"/>
+    <p:sldId id="260" r:id="rId7"/>
+    <p:sldId id="261" r:id="rId8"/>
+    <p:sldId id="263" r:id="rId9"/>
   </p:sldIdLst>
   <p:sldSz cx="12192000" cy="6858000"/>
   <p:notesSz cx="6858000" cy="9144000"/>
@@ -112,7 +117,7 @@
 <file path=ppt/revisionInfo.xml><?xml version="1.0" encoding="utf-8"?>
 <p1510:revInfo xmlns:a="http://schemas.openxmlformats.org/drawingml/2006/main" xmlns:r="http://schemas.openxmlformats.org/officeDocument/2006/relationships" xmlns:p1510="http://schemas.microsoft.com/office/powerpoint/2015/10/main">
   <p1510:revLst>
-    <p1510:client id="{92BFB444-7DBC-CA44-A6DD-A4B3F7DBDADB}" v="2" dt="2025-12-26T12:49:29.669"/>
+    <p1510:client id="{92BFB444-7DBC-CA44-A6DD-A4B3F7DBDADB}" v="43" dt="2025-12-26T13:52:51.793"/>
   </p1510:revLst>
 </p1510:revInfo>
 </file>
@@ -3374,10 +3379,10 @@
           <a:lstStyle/>
           <a:p>
             <a:r>
-              <a:rPr lang="en-US" dirty="0" err="1"/>
+              <a:rPr lang="en-US" noProof="0" dirty="0" err="1"/>
               <a:t>GeoPES</a:t>
             </a:r>
-            <a:endParaRPr lang="en-US" dirty="0"/>
+            <a:endParaRPr lang="en-US" noProof="0" dirty="0"/>
           </a:p>
         </p:txBody>
       </p:sp>
@@ -3403,7 +3408,7 @@
           <a:lstStyle/>
           <a:p>
             <a:r>
-              <a:rPr lang="en-US" dirty="0"/>
+              <a:rPr lang="en-US" noProof="0" dirty="0"/>
               <a:t>A control-oriented Python package emulation numeric types of polytopes, ellipsoids, and subspaces.</a:t>
             </a:r>
           </a:p>
@@ -3461,7 +3466,7 @@
           <a:lstStyle/>
           <a:p>
             <a:r>
-              <a:rPr lang="en-US" dirty="0"/>
+              <a:rPr lang="en-US" noProof="0" dirty="0"/>
               <a:t>Features</a:t>
             </a:r>
           </a:p>
@@ -3493,7 +3498,7 @@
               <a:buAutoNum type="arabicPeriod"/>
             </a:pPr>
             <a:r>
-              <a:rPr lang="en-US" dirty="0"/>
+              <a:rPr lang="en-US" noProof="0" dirty="0"/>
               <a:t>Numeric Type Emulation</a:t>
             </a:r>
           </a:p>
@@ -3502,7 +3507,72 @@
               <a:buFont typeface="+mj-lt"/>
               <a:buAutoNum type="arabicPeriod"/>
             </a:pPr>
-            <a:endParaRPr lang="en-US" dirty="0"/>
+            <a:r>
+              <a:rPr lang="en-US" noProof="0" dirty="0"/>
+              <a:t>Visualization</a:t>
+            </a:r>
+          </a:p>
+          <a:p>
+            <a:pPr marL="514350" indent="-514350">
+              <a:buFont typeface="+mj-lt"/>
+              <a:buAutoNum type="arabicPeriod"/>
+            </a:pPr>
+            <a:r>
+              <a:rPr lang="en-US" noProof="0" dirty="0"/>
+              <a:t>H-representation and V-representation</a:t>
+            </a:r>
+          </a:p>
+          <a:p>
+            <a:pPr marL="514350" indent="-514350">
+              <a:buFont typeface="+mj-lt"/>
+              <a:buAutoNum type="arabicPeriod"/>
+            </a:pPr>
+            <a:r>
+              <a:rPr lang="en-US" noProof="0" dirty="0"/>
+              <a:t>Lazy evaluation/loading</a:t>
+            </a:r>
+          </a:p>
+          <a:p>
+            <a:pPr marL="514350" indent="-514350">
+              <a:buFont typeface="+mj-lt"/>
+              <a:buAutoNum type="arabicPeriod"/>
+            </a:pPr>
+            <a:r>
+              <a:rPr lang="en-US" noProof="0" dirty="0"/>
+              <a:t>Inter-object integration </a:t>
+            </a:r>
+          </a:p>
+          <a:p>
+            <a:pPr marL="514350" indent="-514350">
+              <a:buFont typeface="+mj-lt"/>
+              <a:buAutoNum type="arabicPeriod"/>
+            </a:pPr>
+            <a:r>
+              <a:rPr lang="en-US" noProof="0" dirty="0"/>
+              <a:t>Third-party integration (matplotlib/</a:t>
+            </a:r>
+            <a:r>
+              <a:rPr lang="en-US" noProof="0" dirty="0" err="1"/>
+              <a:t>cvxpy</a:t>
+            </a:r>
+            <a:r>
+              <a:rPr lang="en-US" noProof="0" dirty="0"/>
+              <a:t>)</a:t>
+            </a:r>
+          </a:p>
+          <a:p>
+            <a:pPr marL="514350" indent="-514350">
+              <a:buFont typeface="+mj-lt"/>
+              <a:buAutoNum type="arabicPeriod"/>
+            </a:pPr>
+            <a:endParaRPr lang="en-US" noProof="0" dirty="0"/>
+          </a:p>
+          <a:p>
+            <a:pPr marL="514350" indent="-514350">
+              <a:buFont typeface="+mj-lt"/>
+              <a:buAutoNum type="arabicPeriod"/>
+            </a:pPr>
+            <a:endParaRPr lang="en-US" noProof="0" dirty="0"/>
           </a:p>
         </p:txBody>
       </p:sp>
@@ -3558,7 +3628,7 @@
           <a:lstStyle/>
           <a:p>
             <a:r>
-              <a:rPr lang="en-US" dirty="0"/>
+              <a:rPr lang="en-US" noProof="0" dirty="0"/>
               <a:t>1. Numeric Type Emulation</a:t>
             </a:r>
           </a:p>
@@ -3588,31 +3658,34 @@
           <a:lstStyle/>
           <a:p>
             <a:r>
-              <a:rPr lang="en-US" dirty="0"/>
+              <a:rPr lang="en-US" noProof="0" dirty="0"/>
               <a:t>Math operators write like code</a:t>
             </a:r>
           </a:p>
           <a:p>
-            <a:endParaRPr lang="en-US" dirty="0"/>
-          </a:p>
-          <a:p>
-            <a:endParaRPr lang="en-US" dirty="0"/>
-          </a:p>
-          <a:p>
-            <a:endParaRPr lang="en-US" dirty="0"/>
-          </a:p>
-          <a:p>
-            <a:endParaRPr lang="en-US" dirty="0"/>
-          </a:p>
-          <a:p>
-            <a:endParaRPr lang="en-US" dirty="0"/>
-          </a:p>
-          <a:p>
-            <a:endParaRPr lang="en-US" dirty="0"/>
-          </a:p>
-          <a:p>
-            <a:r>
-              <a:rPr lang="en-US" dirty="0"/>
+            <a:endParaRPr lang="en-US" noProof="0" dirty="0"/>
+          </a:p>
+          <a:p>
+            <a:endParaRPr lang="en-US" noProof="0" dirty="0"/>
+          </a:p>
+          <a:p>
+            <a:endParaRPr lang="en-US" noProof="0" dirty="0"/>
+          </a:p>
+          <a:p>
+            <a:endParaRPr lang="en-US" noProof="0" dirty="0"/>
+          </a:p>
+          <a:p>
+            <a:endParaRPr lang="en-US" noProof="0" dirty="0"/>
+          </a:p>
+          <a:p>
+            <a:pPr marL="0" indent="0">
+              <a:buNone/>
+            </a:pPr>
+            <a:endParaRPr lang="en-US" noProof="0" dirty="0"/>
+          </a:p>
+          <a:p>
+            <a:r>
+              <a:rPr lang="en-US" noProof="0" dirty="0"/>
               <a:t>Goal: To write your code as you would write your math</a:t>
             </a:r>
           </a:p>
@@ -3648,10 +3721,943 @@
           </a:prstGeom>
         </p:spPr>
       </p:pic>
+      <p:pic>
+        <p:nvPicPr>
+          <p:cNvPr id="5" name="Picture 4">
+            <a:extLst>
+              <a:ext uri="{FF2B5EF4-FFF2-40B4-BE49-F238E27FC236}">
+                <a16:creationId xmlns:a16="http://schemas.microsoft.com/office/drawing/2014/main" id="{2A61BDEB-E2F2-534E-902A-D87308EB78E3}"/>
+              </a:ext>
+            </a:extLst>
+          </p:cNvPr>
+          <p:cNvPicPr>
+            <a:picLocks noChangeAspect="1"/>
+          </p:cNvPicPr>
+          <p:nvPr/>
+        </p:nvPicPr>
+        <p:blipFill>
+          <a:blip r:embed="rId3"/>
+          <a:stretch>
+            <a:fillRect/>
+          </a:stretch>
+        </p:blipFill>
+        <p:spPr>
+          <a:xfrm>
+            <a:off x="3968749" y="3622580"/>
+            <a:ext cx="4254500" cy="1701800"/>
+          </a:xfrm>
+          <a:prstGeom prst="rect">
+            <a:avLst/>
+          </a:prstGeom>
+        </p:spPr>
+      </p:pic>
+      <p:sp>
+        <p:nvSpPr>
+          <p:cNvPr id="6" name="TextBox 5">
+            <a:extLst>
+              <a:ext uri="{FF2B5EF4-FFF2-40B4-BE49-F238E27FC236}">
+                <a16:creationId xmlns:a16="http://schemas.microsoft.com/office/drawing/2014/main" id="{E6724EAC-FED4-CA45-3310-65313A613C49}"/>
+              </a:ext>
+            </a:extLst>
+          </p:cNvPr>
+          <p:cNvSpPr txBox="1"/>
+          <p:nvPr/>
+        </p:nvSpPr>
+        <p:spPr>
+          <a:xfrm>
+            <a:off x="7340329" y="1506022"/>
+            <a:ext cx="4013471" cy="369332"/>
+          </a:xfrm>
+          <a:prstGeom prst="rect">
+            <a:avLst/>
+          </a:prstGeom>
+          <a:noFill/>
+        </p:spPr>
+        <p:txBody>
+          <a:bodyPr wrap="none" rtlCol="0">
+            <a:spAutoFit/>
+          </a:bodyPr>
+          <a:lstStyle/>
+          <a:p>
+            <a:r>
+              <a:rPr lang="en-US" b="1" noProof="0" dirty="0">
+                <a:solidFill>
+                  <a:srgbClr val="FF0000"/>
+                </a:solidFill>
+              </a:rPr>
+              <a:t>FIXME: Add table for operators/types</a:t>
+            </a:r>
+          </a:p>
+        </p:txBody>
+      </p:sp>
     </p:spTree>
     <p:extLst>
       <p:ext uri="{BB962C8B-B14F-4D97-AF65-F5344CB8AC3E}">
         <p14:creationId xmlns:p14="http://schemas.microsoft.com/office/powerpoint/2010/main" val="1497374662"/>
+      </p:ext>
+    </p:extLst>
+  </p:cSld>
+  <p:clrMapOvr>
+    <a:masterClrMapping/>
+  </p:clrMapOvr>
+</p:sld>
+</file>
+
+<file path=ppt/slides/slide4.xml><?xml version="1.0" encoding="utf-8"?>
+<p:sld xmlns:a="http://schemas.openxmlformats.org/drawingml/2006/main" xmlns:r="http://schemas.openxmlformats.org/officeDocument/2006/relationships" xmlns:p="http://schemas.openxmlformats.org/presentationml/2006/main">
+  <p:cSld>
+    <p:spTree>
+      <p:nvGrpSpPr>
+        <p:cNvPr id="1" name="">
+          <a:extLst>
+            <a:ext uri="{FF2B5EF4-FFF2-40B4-BE49-F238E27FC236}">
+              <a16:creationId xmlns:a16="http://schemas.microsoft.com/office/drawing/2014/main" id="{2EFCCEE4-D9E4-ADB4-69D6-1A39FBC3174B}"/>
+            </a:ext>
+          </a:extLst>
+        </p:cNvPr>
+        <p:cNvGrpSpPr/>
+        <p:nvPr/>
+      </p:nvGrpSpPr>
+      <p:grpSpPr>
+        <a:xfrm>
+          <a:off x="0" y="0"/>
+          <a:ext cx="0" cy="0"/>
+          <a:chOff x="0" y="0"/>
+          <a:chExt cx="0" cy="0"/>
+        </a:xfrm>
+      </p:grpSpPr>
+      <p:sp>
+        <p:nvSpPr>
+          <p:cNvPr id="2" name="Title 1">
+            <a:extLst>
+              <a:ext uri="{FF2B5EF4-FFF2-40B4-BE49-F238E27FC236}">
+                <a16:creationId xmlns:a16="http://schemas.microsoft.com/office/drawing/2014/main" id="{67014D7B-B72A-2E84-400A-D420433963A3}"/>
+              </a:ext>
+            </a:extLst>
+          </p:cNvPr>
+          <p:cNvSpPr>
+            <a:spLocks noGrp="1"/>
+          </p:cNvSpPr>
+          <p:nvPr>
+            <p:ph type="title"/>
+          </p:nvPr>
+        </p:nvSpPr>
+        <p:spPr/>
+        <p:txBody>
+          <a:bodyPr/>
+          <a:lstStyle/>
+          <a:p>
+            <a:r>
+              <a:rPr lang="en-US" noProof="0" dirty="0"/>
+              <a:t>2. Visualization</a:t>
+            </a:r>
+          </a:p>
+        </p:txBody>
+      </p:sp>
+      <p:sp>
+        <p:nvSpPr>
+          <p:cNvPr id="9" name="Content Placeholder 2">
+            <a:extLst>
+              <a:ext uri="{FF2B5EF4-FFF2-40B4-BE49-F238E27FC236}">
+                <a16:creationId xmlns:a16="http://schemas.microsoft.com/office/drawing/2014/main" id="{C3002F63-6A3A-2E93-5AD8-FC7A3A558243}"/>
+              </a:ext>
+            </a:extLst>
+          </p:cNvPr>
+          <p:cNvSpPr>
+            <a:spLocks noGrp="1"/>
+          </p:cNvSpPr>
+          <p:nvPr>
+            <p:ph idx="1"/>
+          </p:nvPr>
+        </p:nvSpPr>
+        <p:spPr>
+          <a:xfrm>
+            <a:off x="838200" y="1825625"/>
+            <a:ext cx="10515600" cy="4351338"/>
+          </a:xfrm>
+        </p:spPr>
+        <p:txBody>
+          <a:bodyPr>
+            <a:normAutofit/>
+          </a:bodyPr>
+          <a:lstStyle/>
+          <a:p>
+            <a:r>
+              <a:rPr lang="en-US" noProof="0" dirty="0"/>
+              <a:t>n = 1</a:t>
+            </a:r>
+          </a:p>
+          <a:p>
+            <a:r>
+              <a:rPr lang="en-US" noProof="0" dirty="0"/>
+              <a:t>n = 2</a:t>
+            </a:r>
+          </a:p>
+          <a:p>
+            <a:r>
+              <a:rPr lang="en-US" noProof="0" dirty="0"/>
+              <a:t>n = 3</a:t>
+            </a:r>
+          </a:p>
+        </p:txBody>
+      </p:sp>
+      <p:pic>
+        <p:nvPicPr>
+          <p:cNvPr id="11" name="Picture 10" descr="A graph of a oval in a grid&#10;&#10;AI-generated content may be incorrect.">
+            <a:extLst>
+              <a:ext uri="{FF2B5EF4-FFF2-40B4-BE49-F238E27FC236}">
+                <a16:creationId xmlns:a16="http://schemas.microsoft.com/office/drawing/2014/main" id="{5980309A-2DC5-9F55-F477-85F5CCB85F1C}"/>
+              </a:ext>
+            </a:extLst>
+          </p:cNvPr>
+          <p:cNvPicPr>
+            <a:picLocks noChangeAspect="1"/>
+          </p:cNvPicPr>
+          <p:nvPr/>
+        </p:nvPicPr>
+        <p:blipFill>
+          <a:blip r:embed="rId2"/>
+          <a:stretch>
+            <a:fillRect/>
+          </a:stretch>
+        </p:blipFill>
+        <p:spPr>
+          <a:xfrm>
+            <a:off x="2566365" y="2753584"/>
+            <a:ext cx="2827438" cy="2310224"/>
+          </a:xfrm>
+          <a:prstGeom prst="rect">
+            <a:avLst/>
+          </a:prstGeom>
+        </p:spPr>
+      </p:pic>
+      <p:sp>
+        <p:nvSpPr>
+          <p:cNvPr id="12" name="TextBox 11">
+            <a:extLst>
+              <a:ext uri="{FF2B5EF4-FFF2-40B4-BE49-F238E27FC236}">
+                <a16:creationId xmlns:a16="http://schemas.microsoft.com/office/drawing/2014/main" id="{75D5852F-1D36-5656-AD50-AA6EB80B4829}"/>
+              </a:ext>
+            </a:extLst>
+          </p:cNvPr>
+          <p:cNvSpPr txBox="1"/>
+          <p:nvPr/>
+        </p:nvSpPr>
+        <p:spPr>
+          <a:xfrm>
+            <a:off x="2118845" y="5764044"/>
+            <a:ext cx="6874685" cy="646331"/>
+          </a:xfrm>
+          <a:prstGeom prst="rect">
+            <a:avLst/>
+          </a:prstGeom>
+          <a:solidFill>
+            <a:srgbClr val="EC7246"/>
+          </a:solidFill>
+          <a:ln>
+            <a:noFill/>
+          </a:ln>
+        </p:spPr>
+        <p:txBody>
+          <a:bodyPr wrap="square" rtlCol="0">
+            <a:spAutoFit/>
+          </a:bodyPr>
+          <a:lstStyle/>
+          <a:p>
+            <a:pPr algn="ctr"/>
+            <a:r>
+              <a:rPr lang="en-US" b="1" noProof="0" dirty="0">
+                <a:solidFill>
+                  <a:srgbClr val="FFFFFF"/>
+                </a:solidFill>
+              </a:rPr>
+              <a:t>Challenge: </a:t>
+            </a:r>
+            <a:r>
+              <a:rPr lang="en-US" noProof="0" dirty="0">
+                <a:solidFill>
+                  <a:srgbClr val="FFFFFF"/>
+                </a:solidFill>
+              </a:rPr>
+              <a:t>Plotting polytopes in 2D/3D requires ‘sorting’ the vertices/associating each vertex with its corresponding halfplane</a:t>
+            </a:r>
+          </a:p>
+        </p:txBody>
+      </p:sp>
+      <p:pic>
+        <p:nvPicPr>
+          <p:cNvPr id="13" name="Picture 2">
+            <a:extLst>
+              <a:ext uri="{FF2B5EF4-FFF2-40B4-BE49-F238E27FC236}">
+                <a16:creationId xmlns:a16="http://schemas.microsoft.com/office/drawing/2014/main" id="{A4EFDDD7-DAC3-AF3A-556B-34E5A68449C5}"/>
+              </a:ext>
+            </a:extLst>
+          </p:cNvPr>
+          <p:cNvPicPr>
+            <a:picLocks noChangeAspect="1" noChangeArrowheads="1"/>
+          </p:cNvPicPr>
+          <p:nvPr/>
+        </p:nvPicPr>
+        <p:blipFill rotWithShape="1">
+          <a:blip r:embed="rId3">
+            <a:extLst>
+              <a:ext uri="{28A0092B-C50C-407E-A947-70E740481C1C}">
+                <a14:useLocalDpi xmlns:a14="http://schemas.microsoft.com/office/drawing/2010/main" val="0"/>
+              </a:ext>
+            </a:extLst>
+          </a:blip>
+          <a:srcRect l="21313" t="14432" r="8302" b="8890"/>
+          <a:stretch>
+            <a:fillRect/>
+          </a:stretch>
+        </p:blipFill>
+        <p:spPr bwMode="auto">
+          <a:xfrm>
+            <a:off x="6096000" y="2753584"/>
+            <a:ext cx="2827438" cy="2310225"/>
+          </a:xfrm>
+          <a:prstGeom prst="rect">
+            <a:avLst/>
+          </a:prstGeom>
+          <a:noFill/>
+          <a:extLst>
+            <a:ext uri="{909E8E84-426E-40DD-AFC4-6F175D3DCCD1}">
+              <a14:hiddenFill xmlns:a14="http://schemas.microsoft.com/office/drawing/2010/main">
+                <a:solidFill>
+                  <a:srgbClr val="FFFFFF"/>
+                </a:solidFill>
+              </a14:hiddenFill>
+            </a:ext>
+          </a:extLst>
+        </p:spPr>
+      </p:pic>
+    </p:spTree>
+    <p:extLst>
+      <p:ext uri="{BB962C8B-B14F-4D97-AF65-F5344CB8AC3E}">
+        <p14:creationId xmlns:p14="http://schemas.microsoft.com/office/powerpoint/2010/main" val="3993348157"/>
+      </p:ext>
+    </p:extLst>
+  </p:cSld>
+  <p:clrMapOvr>
+    <a:masterClrMapping/>
+  </p:clrMapOvr>
+</p:sld>
+</file>
+
+<file path=ppt/slides/slide5.xml><?xml version="1.0" encoding="utf-8"?>
+<p:sld xmlns:a="http://schemas.openxmlformats.org/drawingml/2006/main" xmlns:r="http://schemas.openxmlformats.org/officeDocument/2006/relationships" xmlns:p="http://schemas.openxmlformats.org/presentationml/2006/main">
+  <p:cSld>
+    <p:spTree>
+      <p:nvGrpSpPr>
+        <p:cNvPr id="1" name="">
+          <a:extLst>
+            <a:ext uri="{FF2B5EF4-FFF2-40B4-BE49-F238E27FC236}">
+              <a16:creationId xmlns:a16="http://schemas.microsoft.com/office/drawing/2014/main" id="{942F2BA3-3ADE-0C66-50CF-27866EACFBF2}"/>
+            </a:ext>
+          </a:extLst>
+        </p:cNvPr>
+        <p:cNvGrpSpPr/>
+        <p:nvPr/>
+      </p:nvGrpSpPr>
+      <p:grpSpPr>
+        <a:xfrm>
+          <a:off x="0" y="0"/>
+          <a:ext cx="0" cy="0"/>
+          <a:chOff x="0" y="0"/>
+          <a:chExt cx="0" cy="0"/>
+        </a:xfrm>
+      </p:grpSpPr>
+      <p:sp>
+        <p:nvSpPr>
+          <p:cNvPr id="2" name="Title 1">
+            <a:extLst>
+              <a:ext uri="{FF2B5EF4-FFF2-40B4-BE49-F238E27FC236}">
+                <a16:creationId xmlns:a16="http://schemas.microsoft.com/office/drawing/2014/main" id="{2592EE6A-AD05-6EA6-1A4A-7EA327C188D8}"/>
+              </a:ext>
+            </a:extLst>
+          </p:cNvPr>
+          <p:cNvSpPr>
+            <a:spLocks noGrp="1"/>
+          </p:cNvSpPr>
+          <p:nvPr>
+            <p:ph type="title"/>
+          </p:nvPr>
+        </p:nvSpPr>
+        <p:spPr/>
+        <p:txBody>
+          <a:bodyPr/>
+          <a:lstStyle/>
+          <a:p>
+            <a:r>
+              <a:rPr lang="en-US" noProof="0" dirty="0"/>
+              <a:t>3. H-representation and V-representation</a:t>
+            </a:r>
+          </a:p>
+        </p:txBody>
+      </p:sp>
+      <p:sp>
+        <p:nvSpPr>
+          <p:cNvPr id="9" name="Content Placeholder 2">
+            <a:extLst>
+              <a:ext uri="{FF2B5EF4-FFF2-40B4-BE49-F238E27FC236}">
+                <a16:creationId xmlns:a16="http://schemas.microsoft.com/office/drawing/2014/main" id="{C388D0C5-9C20-8EDC-28CB-9D9FA974CA36}"/>
+              </a:ext>
+            </a:extLst>
+          </p:cNvPr>
+          <p:cNvSpPr>
+            <a:spLocks noGrp="1"/>
+          </p:cNvSpPr>
+          <p:nvPr>
+            <p:ph idx="1"/>
+          </p:nvPr>
+        </p:nvSpPr>
+        <p:spPr>
+          <a:xfrm>
+            <a:off x="838200" y="1825625"/>
+            <a:ext cx="10515600" cy="4351338"/>
+          </a:xfrm>
+        </p:spPr>
+        <p:txBody>
+          <a:bodyPr>
+            <a:normAutofit/>
+          </a:bodyPr>
+          <a:lstStyle/>
+          <a:p>
+            <a:pPr marL="0" indent="0">
+              <a:buNone/>
+            </a:pPr>
+            <a:r>
+              <a:rPr lang="en-US" noProof="0" dirty="0"/>
+              <a:t>A polytope can be represented as either an H-representation or a V-representation: upon creation, the other representation is not explicitly computed (because this can be computationally very expensive).</a:t>
+            </a:r>
+          </a:p>
+          <a:p>
+            <a:r>
+              <a:rPr lang="en-US" noProof="0" dirty="0"/>
+              <a:t>Achieved by operator overload of __</a:t>
+            </a:r>
+            <a:r>
+              <a:rPr lang="en-US" noProof="0" dirty="0" err="1"/>
+              <a:t>init</a:t>
+            </a:r>
+            <a:r>
+              <a:rPr lang="en-US" noProof="0" dirty="0"/>
+              <a:t>__ method</a:t>
+            </a:r>
+          </a:p>
+        </p:txBody>
+      </p:sp>
+      <p:pic>
+        <p:nvPicPr>
+          <p:cNvPr id="3" name="Picture 2">
+            <a:extLst>
+              <a:ext uri="{FF2B5EF4-FFF2-40B4-BE49-F238E27FC236}">
+                <a16:creationId xmlns:a16="http://schemas.microsoft.com/office/drawing/2014/main" id="{F5AB8FC3-8718-3D02-C2DA-DF27B7F4C163}"/>
+              </a:ext>
+            </a:extLst>
+          </p:cNvPr>
+          <p:cNvPicPr>
+            <a:picLocks noChangeAspect="1"/>
+          </p:cNvPicPr>
+          <p:nvPr/>
+        </p:nvPicPr>
+        <p:blipFill>
+          <a:blip r:embed="rId2"/>
+          <a:stretch>
+            <a:fillRect/>
+          </a:stretch>
+        </p:blipFill>
+        <p:spPr>
+          <a:xfrm>
+            <a:off x="1538469" y="4001294"/>
+            <a:ext cx="4063678" cy="2543928"/>
+          </a:xfrm>
+          <a:prstGeom prst="rect">
+            <a:avLst/>
+          </a:prstGeom>
+        </p:spPr>
+      </p:pic>
+    </p:spTree>
+    <p:extLst>
+      <p:ext uri="{BB962C8B-B14F-4D97-AF65-F5344CB8AC3E}">
+        <p14:creationId xmlns:p14="http://schemas.microsoft.com/office/powerpoint/2010/main" val="1320301038"/>
+      </p:ext>
+    </p:extLst>
+  </p:cSld>
+  <p:clrMapOvr>
+    <a:masterClrMapping/>
+  </p:clrMapOvr>
+</p:sld>
+</file>
+
+<file path=ppt/slides/slide6.xml><?xml version="1.0" encoding="utf-8"?>
+<p:sld xmlns:a="http://schemas.openxmlformats.org/drawingml/2006/main" xmlns:r="http://schemas.openxmlformats.org/officeDocument/2006/relationships" xmlns:p="http://schemas.openxmlformats.org/presentationml/2006/main">
+  <p:cSld>
+    <p:spTree>
+      <p:nvGrpSpPr>
+        <p:cNvPr id="1" name="">
+          <a:extLst>
+            <a:ext uri="{FF2B5EF4-FFF2-40B4-BE49-F238E27FC236}">
+              <a16:creationId xmlns:a16="http://schemas.microsoft.com/office/drawing/2014/main" id="{5ECC968A-2FF9-EEF0-AD71-4287E96866EF}"/>
+            </a:ext>
+          </a:extLst>
+        </p:cNvPr>
+        <p:cNvGrpSpPr/>
+        <p:nvPr/>
+      </p:nvGrpSpPr>
+      <p:grpSpPr>
+        <a:xfrm>
+          <a:off x="0" y="0"/>
+          <a:ext cx="0" cy="0"/>
+          <a:chOff x="0" y="0"/>
+          <a:chExt cx="0" cy="0"/>
+        </a:xfrm>
+      </p:grpSpPr>
+      <p:sp>
+        <p:nvSpPr>
+          <p:cNvPr id="2" name="Title 1">
+            <a:extLst>
+              <a:ext uri="{FF2B5EF4-FFF2-40B4-BE49-F238E27FC236}">
+                <a16:creationId xmlns:a16="http://schemas.microsoft.com/office/drawing/2014/main" id="{3E179F48-7165-7991-F11F-8BC1A9748973}"/>
+              </a:ext>
+            </a:extLst>
+          </p:cNvPr>
+          <p:cNvSpPr>
+            <a:spLocks noGrp="1"/>
+          </p:cNvSpPr>
+          <p:nvPr>
+            <p:ph type="title"/>
+          </p:nvPr>
+        </p:nvSpPr>
+        <p:spPr/>
+        <p:txBody>
+          <a:bodyPr/>
+          <a:lstStyle/>
+          <a:p>
+            <a:r>
+              <a:rPr lang="en-US" noProof="0" dirty="0"/>
+              <a:t>4. Lazy evaluation/loading</a:t>
+            </a:r>
+          </a:p>
+        </p:txBody>
+      </p:sp>
+      <p:sp>
+        <p:nvSpPr>
+          <p:cNvPr id="9" name="Content Placeholder 2">
+            <a:extLst>
+              <a:ext uri="{FF2B5EF4-FFF2-40B4-BE49-F238E27FC236}">
+                <a16:creationId xmlns:a16="http://schemas.microsoft.com/office/drawing/2014/main" id="{EDA5731D-E44C-09F3-F516-2CA8FBB0E8C1}"/>
+              </a:ext>
+            </a:extLst>
+          </p:cNvPr>
+          <p:cNvSpPr>
+            <a:spLocks noGrp="1"/>
+          </p:cNvSpPr>
+          <p:nvPr>
+            <p:ph idx="1"/>
+          </p:nvPr>
+        </p:nvSpPr>
+        <p:spPr>
+          <a:xfrm>
+            <a:off x="838200" y="1825625"/>
+            <a:ext cx="10515600" cy="4351338"/>
+          </a:xfrm>
+        </p:spPr>
+        <p:txBody>
+          <a:bodyPr>
+            <a:normAutofit/>
+          </a:bodyPr>
+          <a:lstStyle/>
+          <a:p>
+            <a:pPr marL="571500" indent="-571500">
+              <a:buFont typeface="+mj-lt"/>
+              <a:buAutoNum type="romanUcPeriod"/>
+            </a:pPr>
+            <a:r>
+              <a:rPr lang="en-US" noProof="0" dirty="0"/>
+              <a:t>Certain properties (i.e., </a:t>
+            </a:r>
+            <a:r>
+              <a:rPr lang="en-US" noProof="0" dirty="0" err="1"/>
+              <a:t>poly.vol</a:t>
+            </a:r>
+            <a:r>
+              <a:rPr lang="en-US" noProof="0" dirty="0"/>
+              <a:t>) are expensive to calculate. These properties are not calculated at object initialization, but only when the ‘attribute’ is accessed (and then, they are saved to the object).</a:t>
+            </a:r>
+          </a:p>
+          <a:p>
+            <a:pPr lvl="1"/>
+            <a:r>
+              <a:rPr lang="en-US" noProof="0" dirty="0"/>
+              <a:t>Same for H-</a:t>
+            </a:r>
+            <a:r>
+              <a:rPr lang="en-US" noProof="0" dirty="0" err="1"/>
+              <a:t>repr</a:t>
+            </a:r>
+            <a:r>
+              <a:rPr lang="en-US" noProof="0" dirty="0"/>
+              <a:t> and V-</a:t>
+            </a:r>
+            <a:r>
+              <a:rPr lang="en-US" noProof="0" dirty="0" err="1"/>
+              <a:t>repr</a:t>
+            </a:r>
+            <a:r>
+              <a:rPr lang="en-US" noProof="0" dirty="0"/>
+              <a:t> of a polytope.</a:t>
+            </a:r>
+          </a:p>
+          <a:p>
+            <a:pPr marL="571500" indent="-571500">
+              <a:buFont typeface="+mj-lt"/>
+              <a:buAutoNum type="romanUcPeriod"/>
+            </a:pPr>
+            <a:r>
+              <a:rPr lang="en-US" noProof="0" dirty="0"/>
+              <a:t>Certain packages (e.g., matplotlib/</a:t>
+            </a:r>
+            <a:r>
+              <a:rPr lang="en-US" noProof="0" dirty="0" err="1"/>
+              <a:t>cvxpy</a:t>
+            </a:r>
+            <a:r>
+              <a:rPr lang="en-US" noProof="0" dirty="0"/>
+              <a:t>) are optional dependencies. These are only imported when called.</a:t>
+            </a:r>
+          </a:p>
+          <a:p>
+            <a:pPr lvl="1"/>
+            <a:r>
+              <a:rPr lang="en-US" noProof="0" dirty="0"/>
+              <a:t>Might create a marginal speed-up.</a:t>
+            </a:r>
+          </a:p>
+          <a:p>
+            <a:pPr lvl="1"/>
+            <a:r>
+              <a:rPr lang="en-US" noProof="0" dirty="0"/>
+              <a:t>The least possible amount of dependencies -&gt; improves longevity.</a:t>
+            </a:r>
+          </a:p>
+          <a:p>
+            <a:endParaRPr lang="en-US" noProof="0" dirty="0"/>
+          </a:p>
+        </p:txBody>
+      </p:sp>
+      <p:pic>
+        <p:nvPicPr>
+          <p:cNvPr id="3" name="Picture 2">
+            <a:extLst>
+              <a:ext uri="{FF2B5EF4-FFF2-40B4-BE49-F238E27FC236}">
+                <a16:creationId xmlns:a16="http://schemas.microsoft.com/office/drawing/2014/main" id="{82009382-CC2F-76DB-A9A7-2CD6A9F9E101}"/>
+              </a:ext>
+            </a:extLst>
+          </p:cNvPr>
+          <p:cNvPicPr>
+            <a:picLocks noChangeAspect="1"/>
+          </p:cNvPicPr>
+          <p:nvPr/>
+        </p:nvPicPr>
+        <p:blipFill>
+          <a:blip r:embed="rId2"/>
+          <a:stretch>
+            <a:fillRect/>
+          </a:stretch>
+        </p:blipFill>
+        <p:spPr>
+          <a:xfrm>
+            <a:off x="2425700" y="5707063"/>
+            <a:ext cx="7340600" cy="939800"/>
+          </a:xfrm>
+          <a:prstGeom prst="rect">
+            <a:avLst/>
+          </a:prstGeom>
+        </p:spPr>
+      </p:pic>
+    </p:spTree>
+    <p:extLst>
+      <p:ext uri="{BB962C8B-B14F-4D97-AF65-F5344CB8AC3E}">
+        <p14:creationId xmlns:p14="http://schemas.microsoft.com/office/powerpoint/2010/main" val="2565428227"/>
+      </p:ext>
+    </p:extLst>
+  </p:cSld>
+  <p:clrMapOvr>
+    <a:masterClrMapping/>
+  </p:clrMapOvr>
+</p:sld>
+</file>
+
+<file path=ppt/slides/slide7.xml><?xml version="1.0" encoding="utf-8"?>
+<p:sld xmlns:a="http://schemas.openxmlformats.org/drawingml/2006/main" xmlns:r="http://schemas.openxmlformats.org/officeDocument/2006/relationships" xmlns:p="http://schemas.openxmlformats.org/presentationml/2006/main">
+  <p:cSld>
+    <p:spTree>
+      <p:nvGrpSpPr>
+        <p:cNvPr id="1" name="">
+          <a:extLst>
+            <a:ext uri="{FF2B5EF4-FFF2-40B4-BE49-F238E27FC236}">
+              <a16:creationId xmlns:a16="http://schemas.microsoft.com/office/drawing/2014/main" id="{727EF6F4-8AF4-E484-83E6-38FB266F0103}"/>
+            </a:ext>
+          </a:extLst>
+        </p:cNvPr>
+        <p:cNvGrpSpPr/>
+        <p:nvPr/>
+      </p:nvGrpSpPr>
+      <p:grpSpPr>
+        <a:xfrm>
+          <a:off x="0" y="0"/>
+          <a:ext cx="0" cy="0"/>
+          <a:chOff x="0" y="0"/>
+          <a:chExt cx="0" cy="0"/>
+        </a:xfrm>
+      </p:grpSpPr>
+      <p:sp>
+        <p:nvSpPr>
+          <p:cNvPr id="2" name="Title 1">
+            <a:extLst>
+              <a:ext uri="{FF2B5EF4-FFF2-40B4-BE49-F238E27FC236}">
+                <a16:creationId xmlns:a16="http://schemas.microsoft.com/office/drawing/2014/main" id="{B6F5311A-285F-1AF0-AA22-035F5475185A}"/>
+              </a:ext>
+            </a:extLst>
+          </p:cNvPr>
+          <p:cNvSpPr>
+            <a:spLocks noGrp="1"/>
+          </p:cNvSpPr>
+          <p:nvPr>
+            <p:ph type="title"/>
+          </p:nvPr>
+        </p:nvSpPr>
+        <p:spPr/>
+        <p:txBody>
+          <a:bodyPr/>
+          <a:lstStyle/>
+          <a:p>
+            <a:r>
+              <a:rPr lang="en-US" noProof="0" dirty="0"/>
+              <a:t>5. Inter-object integration</a:t>
+            </a:r>
+          </a:p>
+        </p:txBody>
+      </p:sp>
+      <p:sp>
+        <p:nvSpPr>
+          <p:cNvPr id="9" name="Content Placeholder 2">
+            <a:extLst>
+              <a:ext uri="{FF2B5EF4-FFF2-40B4-BE49-F238E27FC236}">
+                <a16:creationId xmlns:a16="http://schemas.microsoft.com/office/drawing/2014/main" id="{DFFE622F-DF29-F4DB-3761-6132F1BF75FA}"/>
+              </a:ext>
+            </a:extLst>
+          </p:cNvPr>
+          <p:cNvSpPr>
+            <a:spLocks noGrp="1"/>
+          </p:cNvSpPr>
+          <p:nvPr>
+            <p:ph idx="1"/>
+          </p:nvPr>
+        </p:nvSpPr>
+        <p:spPr>
+          <a:xfrm>
+            <a:off x="838200" y="1825625"/>
+            <a:ext cx="10515600" cy="4351338"/>
+          </a:xfrm>
+        </p:spPr>
+        <p:txBody>
+          <a:bodyPr>
+            <a:normAutofit/>
+          </a:bodyPr>
+          <a:lstStyle/>
+          <a:p>
+            <a:pPr marL="0" indent="0">
+              <a:buNone/>
+            </a:pPr>
+            <a:r>
+              <a:rPr lang="en-US" noProof="0" dirty="0"/>
+              <a:t>The toolbox allows the user to do operations between objects of different classes seamlessly.</a:t>
+            </a:r>
+          </a:p>
+          <a:p>
+            <a:r>
+              <a:rPr lang="en-US" noProof="0" dirty="0"/>
+              <a:t>Intersection ellipsoid with subspace -&gt; ellipsoid</a:t>
+            </a:r>
+          </a:p>
+          <a:p>
+            <a:r>
+              <a:rPr lang="en-US" noProof="0" dirty="0"/>
+              <a:t>Projection of polytope on subspace -&gt; polytope</a:t>
+            </a:r>
+          </a:p>
+          <a:p>
+            <a:r>
+              <a:rPr lang="en-US" noProof="0" dirty="0"/>
+              <a:t>Over/under-approximating an ellipsoid with a polytope</a:t>
+            </a:r>
+          </a:p>
+          <a:p>
+            <a:r>
+              <a:rPr lang="en-US" noProof="0" dirty="0"/>
+              <a:t>Over/under-approximating a polytope with an ellipsoid</a:t>
+            </a:r>
+          </a:p>
+          <a:p>
+            <a:r>
+              <a:rPr lang="en-US" noProof="0" dirty="0"/>
+              <a:t>⋮</a:t>
+            </a:r>
+          </a:p>
+        </p:txBody>
+      </p:sp>
+    </p:spTree>
+    <p:extLst>
+      <p:ext uri="{BB962C8B-B14F-4D97-AF65-F5344CB8AC3E}">
+        <p14:creationId xmlns:p14="http://schemas.microsoft.com/office/powerpoint/2010/main" val="3686185399"/>
+      </p:ext>
+    </p:extLst>
+  </p:cSld>
+  <p:clrMapOvr>
+    <a:masterClrMapping/>
+  </p:clrMapOvr>
+</p:sld>
+</file>
+
+<file path=ppt/slides/slide8.xml><?xml version="1.0" encoding="utf-8"?>
+<p:sld xmlns:a="http://schemas.openxmlformats.org/drawingml/2006/main" xmlns:r="http://schemas.openxmlformats.org/officeDocument/2006/relationships" xmlns:p="http://schemas.openxmlformats.org/presentationml/2006/main">
+  <p:cSld>
+    <p:spTree>
+      <p:nvGrpSpPr>
+        <p:cNvPr id="1" name="">
+          <a:extLst>
+            <a:ext uri="{FF2B5EF4-FFF2-40B4-BE49-F238E27FC236}">
+              <a16:creationId xmlns:a16="http://schemas.microsoft.com/office/drawing/2014/main" id="{644443AF-D87D-72C4-C0B5-43B921A837C5}"/>
+            </a:ext>
+          </a:extLst>
+        </p:cNvPr>
+        <p:cNvGrpSpPr/>
+        <p:nvPr/>
+      </p:nvGrpSpPr>
+      <p:grpSpPr>
+        <a:xfrm>
+          <a:off x="0" y="0"/>
+          <a:ext cx="0" cy="0"/>
+          <a:chOff x="0" y="0"/>
+          <a:chExt cx="0" cy="0"/>
+        </a:xfrm>
+      </p:grpSpPr>
+      <p:sp>
+        <p:nvSpPr>
+          <p:cNvPr id="2" name="Title 1">
+            <a:extLst>
+              <a:ext uri="{FF2B5EF4-FFF2-40B4-BE49-F238E27FC236}">
+                <a16:creationId xmlns:a16="http://schemas.microsoft.com/office/drawing/2014/main" id="{A71E7113-CCF9-8A13-4E22-BF2A99CFA936}"/>
+              </a:ext>
+            </a:extLst>
+          </p:cNvPr>
+          <p:cNvSpPr>
+            <a:spLocks noGrp="1"/>
+          </p:cNvSpPr>
+          <p:nvPr>
+            <p:ph type="title"/>
+          </p:nvPr>
+        </p:nvSpPr>
+        <p:spPr/>
+        <p:txBody>
+          <a:bodyPr/>
+          <a:lstStyle/>
+          <a:p>
+            <a:r>
+              <a:rPr lang="en-US" noProof="0" dirty="0"/>
+              <a:t>6. External libraries integration</a:t>
+            </a:r>
+          </a:p>
+        </p:txBody>
+      </p:sp>
+      <p:sp>
+        <p:nvSpPr>
+          <p:cNvPr id="9" name="Content Placeholder 2">
+            <a:extLst>
+              <a:ext uri="{FF2B5EF4-FFF2-40B4-BE49-F238E27FC236}">
+                <a16:creationId xmlns:a16="http://schemas.microsoft.com/office/drawing/2014/main" id="{0D51A29D-AE98-D7FA-EE99-8D99F651549E}"/>
+              </a:ext>
+            </a:extLst>
+          </p:cNvPr>
+          <p:cNvSpPr>
+            <a:spLocks noGrp="1"/>
+          </p:cNvSpPr>
+          <p:nvPr>
+            <p:ph idx="1"/>
+          </p:nvPr>
+        </p:nvSpPr>
+        <p:spPr>
+          <a:xfrm>
+            <a:off x="838200" y="1825625"/>
+            <a:ext cx="10515600" cy="4351338"/>
+          </a:xfrm>
+        </p:spPr>
+        <p:txBody>
+          <a:bodyPr>
+            <a:normAutofit/>
+          </a:bodyPr>
+          <a:lstStyle/>
+          <a:p>
+            <a:pPr marL="0" indent="0">
+              <a:buNone/>
+            </a:pPr>
+            <a:r>
+              <a:rPr lang="en-US" noProof="0" dirty="0"/>
+              <a:t>The toolbox has special integration features with external libraries.</a:t>
+            </a:r>
+          </a:p>
+          <a:p>
+            <a:r>
+              <a:rPr lang="en-US" dirty="0"/>
+              <a:t>c</a:t>
+            </a:r>
+            <a:r>
+              <a:rPr lang="en-US" noProof="0" dirty="0" err="1"/>
+              <a:t>vxpy</a:t>
+            </a:r>
+            <a:r>
+              <a:rPr lang="en-US" noProof="0" dirty="0"/>
+              <a:t>: used for internal optimization and external convex optimization problems formulation.</a:t>
+            </a:r>
+          </a:p>
+        </p:txBody>
+      </p:sp>
+      <p:pic>
+        <p:nvPicPr>
+          <p:cNvPr id="3" name="Picture 2">
+            <a:extLst>
+              <a:ext uri="{FF2B5EF4-FFF2-40B4-BE49-F238E27FC236}">
+                <a16:creationId xmlns:a16="http://schemas.microsoft.com/office/drawing/2014/main" id="{A1640261-66E3-4718-6FCF-FF62042E2B70}"/>
+              </a:ext>
+            </a:extLst>
+          </p:cNvPr>
+          <p:cNvPicPr>
+            <a:picLocks noChangeAspect="1"/>
+          </p:cNvPicPr>
+          <p:nvPr/>
+        </p:nvPicPr>
+        <p:blipFill>
+          <a:blip r:embed="rId2"/>
+          <a:stretch>
+            <a:fillRect/>
+          </a:stretch>
+        </p:blipFill>
+        <p:spPr>
+          <a:xfrm>
+            <a:off x="1755011" y="3325098"/>
+            <a:ext cx="8681977" cy="832904"/>
+          </a:xfrm>
+          <a:prstGeom prst="rect">
+            <a:avLst/>
+          </a:prstGeom>
+        </p:spPr>
+      </p:pic>
+    </p:spTree>
+    <p:extLst>
+      <p:ext uri="{BB962C8B-B14F-4D97-AF65-F5344CB8AC3E}">
+        <p14:creationId xmlns:p14="http://schemas.microsoft.com/office/powerpoint/2010/main" val="3078444715"/>
       </p:ext>
     </p:extLst>
   </p:cSld>

</xml_diff>

<commit_message>
Added comments on cdd, cddplus and cddlib homepage
</commit_message>
<xml_diff>
--- a/presentation.pptx
+++ b/presentation.pptx
@@ -9,10 +9,11 @@
     <p:sldId id="257" r:id="rId3"/>
     <p:sldId id="258" r:id="rId4"/>
     <p:sldId id="259" r:id="rId5"/>
-    <p:sldId id="262" r:id="rId6"/>
-    <p:sldId id="260" r:id="rId7"/>
-    <p:sldId id="261" r:id="rId8"/>
-    <p:sldId id="263" r:id="rId9"/>
+    <p:sldId id="264" r:id="rId6"/>
+    <p:sldId id="262" r:id="rId7"/>
+    <p:sldId id="260" r:id="rId8"/>
+    <p:sldId id="261" r:id="rId9"/>
+    <p:sldId id="263" r:id="rId10"/>
   </p:sldIdLst>
   <p:sldSz cx="12192000" cy="6858000"/>
   <p:notesSz cx="6858000" cy="9144000"/>
@@ -117,7 +118,7 @@
 <file path=ppt/revisionInfo.xml><?xml version="1.0" encoding="utf-8"?>
 <p1510:revInfo xmlns:a="http://schemas.openxmlformats.org/drawingml/2006/main" xmlns:r="http://schemas.openxmlformats.org/officeDocument/2006/relationships" xmlns:p1510="http://schemas.microsoft.com/office/powerpoint/2015/10/main">
   <p1510:revLst>
-    <p1510:client id="{92BFB444-7DBC-CA44-A6DD-A4B3F7DBDADB}" v="43" dt="2025-12-26T13:52:51.793"/>
+    <p1510:client id="{92BFB444-7DBC-CA44-A6DD-A4B3F7DBDADB}" v="46" dt="2025-12-26T14:10:48.577"/>
   </p1510:revLst>
 </p1510:revInfo>
 </file>
@@ -4052,6 +4053,113 @@
         <p:cNvPr id="1" name="">
           <a:extLst>
             <a:ext uri="{FF2B5EF4-FFF2-40B4-BE49-F238E27FC236}">
+              <a16:creationId xmlns:a16="http://schemas.microsoft.com/office/drawing/2014/main" id="{236D9DF1-4C77-12DC-8531-9927F0AE6310}"/>
+            </a:ext>
+          </a:extLst>
+        </p:cNvPr>
+        <p:cNvGrpSpPr/>
+        <p:nvPr/>
+      </p:nvGrpSpPr>
+      <p:grpSpPr>
+        <a:xfrm>
+          <a:off x="0" y="0"/>
+          <a:ext cx="0" cy="0"/>
+          <a:chOff x="0" y="0"/>
+          <a:chExt cx="0" cy="0"/>
+        </a:xfrm>
+      </p:grpSpPr>
+      <p:sp>
+        <p:nvSpPr>
+          <p:cNvPr id="2" name="Title 1">
+            <a:extLst>
+              <a:ext uri="{FF2B5EF4-FFF2-40B4-BE49-F238E27FC236}">
+                <a16:creationId xmlns:a16="http://schemas.microsoft.com/office/drawing/2014/main" id="{A427178D-EA2F-DAD2-E948-C9BB177DF712}"/>
+              </a:ext>
+            </a:extLst>
+          </p:cNvPr>
+          <p:cNvSpPr>
+            <a:spLocks noGrp="1"/>
+          </p:cNvSpPr>
+          <p:nvPr>
+            <p:ph type="title"/>
+          </p:nvPr>
+        </p:nvSpPr>
+        <p:spPr/>
+        <p:txBody>
+          <a:bodyPr/>
+          <a:lstStyle/>
+          <a:p>
+            <a:r>
+              <a:rPr lang="en-US" noProof="0" dirty="0"/>
+              <a:t>2. Visualization</a:t>
+            </a:r>
+          </a:p>
+        </p:txBody>
+      </p:sp>
+      <p:sp>
+        <p:nvSpPr>
+          <p:cNvPr id="9" name="Content Placeholder 2">
+            <a:extLst>
+              <a:ext uri="{FF2B5EF4-FFF2-40B4-BE49-F238E27FC236}">
+                <a16:creationId xmlns:a16="http://schemas.microsoft.com/office/drawing/2014/main" id="{BEAC4FD7-0C6C-443D-C688-EF13A102E1EC}"/>
+              </a:ext>
+            </a:extLst>
+          </p:cNvPr>
+          <p:cNvSpPr>
+            <a:spLocks noGrp="1"/>
+          </p:cNvSpPr>
+          <p:nvPr>
+            <p:ph idx="1"/>
+          </p:nvPr>
+        </p:nvSpPr>
+        <p:spPr>
+          <a:xfrm>
+            <a:off x="838200" y="1825625"/>
+            <a:ext cx="10515600" cy="4351338"/>
+          </a:xfrm>
+        </p:spPr>
+        <p:txBody>
+          <a:bodyPr>
+            <a:normAutofit/>
+          </a:bodyPr>
+          <a:lstStyle/>
+          <a:p>
+            <a:pPr marL="0" indent="0">
+              <a:buNone/>
+            </a:pPr>
+            <a:r>
+              <a:rPr lang="en-US" noProof="0" dirty="0"/>
+              <a:t>Also, extensive pretty printing and printing formats for the </a:t>
+            </a:r>
+            <a:r>
+              <a:rPr lang="en-US" noProof="0"/>
+              <a:t>different classes.</a:t>
+            </a:r>
+            <a:endParaRPr lang="en-US" noProof="0" dirty="0"/>
+          </a:p>
+        </p:txBody>
+      </p:sp>
+    </p:spTree>
+    <p:extLst>
+      <p:ext uri="{BB962C8B-B14F-4D97-AF65-F5344CB8AC3E}">
+        <p14:creationId xmlns:p14="http://schemas.microsoft.com/office/powerpoint/2010/main" val="3937311884"/>
+      </p:ext>
+    </p:extLst>
+  </p:cSld>
+  <p:clrMapOvr>
+    <a:masterClrMapping/>
+  </p:clrMapOvr>
+</p:sld>
+</file>
+
+<file path=ppt/slides/slide6.xml><?xml version="1.0" encoding="utf-8"?>
+<p:sld xmlns:a="http://schemas.openxmlformats.org/drawingml/2006/main" xmlns:r="http://schemas.openxmlformats.org/officeDocument/2006/relationships" xmlns:p="http://schemas.openxmlformats.org/presentationml/2006/main">
+  <p:cSld>
+    <p:spTree>
+      <p:nvGrpSpPr>
+        <p:cNvPr id="1" name="">
+          <a:extLst>
+            <a:ext uri="{FF2B5EF4-FFF2-40B4-BE49-F238E27FC236}">
               <a16:creationId xmlns:a16="http://schemas.microsoft.com/office/drawing/2014/main" id="{942F2BA3-3ADE-0C66-50CF-27866EACFBF2}"/>
             </a:ext>
           </a:extLst>
@@ -4190,7 +4298,7 @@
 </p:sld>
 </file>
 
-<file path=ppt/slides/slide6.xml><?xml version="1.0" encoding="utf-8"?>
+<file path=ppt/slides/slide7.xml><?xml version="1.0" encoding="utf-8"?>
 <p:sld xmlns:a="http://schemas.openxmlformats.org/drawingml/2006/main" xmlns:r="http://schemas.openxmlformats.org/officeDocument/2006/relationships" xmlns:p="http://schemas.openxmlformats.org/presentationml/2006/main">
   <p:cSld>
     <p:spTree>
@@ -4389,7 +4497,7 @@
 </p:sld>
 </file>
 
-<file path=ppt/slides/slide7.xml><?xml version="1.0" encoding="utf-8"?>
+<file path=ppt/slides/slide8.xml><?xml version="1.0" encoding="utf-8"?>
 <p:sld xmlns:a="http://schemas.openxmlformats.org/drawingml/2006/main" xmlns:r="http://schemas.openxmlformats.org/officeDocument/2006/relationships" xmlns:p="http://schemas.openxmlformats.org/presentationml/2006/main">
   <p:cSld>
     <p:spTree>
@@ -4521,7 +4629,7 @@
 </p:sld>
 </file>
 
-<file path=ppt/slides/slide8.xml><?xml version="1.0" encoding="utf-8"?>
+<file path=ppt/slides/slide9.xml><?xml version="1.0" encoding="utf-8"?>
 <p:sld xmlns:a="http://schemas.openxmlformats.org/drawingml/2006/main" xmlns:r="http://schemas.openxmlformats.org/officeDocument/2006/relationships" xmlns:p="http://schemas.openxmlformats.org/presentationml/2006/main">
   <p:cSld>
     <p:spTree>

</xml_diff>

<commit_message>
Added a script testruncddlib, which adds working transformation from H-repr to V-repr!
</commit_message>
<xml_diff>
--- a/presentation.pptx
+++ b/presentation.pptx
@@ -14,6 +14,7 @@
     <p:sldId id="260" r:id="rId8"/>
     <p:sldId id="261" r:id="rId9"/>
     <p:sldId id="263" r:id="rId10"/>
+    <p:sldId id="265" r:id="rId11"/>
   </p:sldIdLst>
   <p:sldSz cx="12192000" cy="6858000"/>
   <p:notesSz cx="6858000" cy="9144000"/>
@@ -118,7 +119,7 @@
 <file path=ppt/revisionInfo.xml><?xml version="1.0" encoding="utf-8"?>
 <p1510:revInfo xmlns:a="http://schemas.openxmlformats.org/drawingml/2006/main" xmlns:r="http://schemas.openxmlformats.org/officeDocument/2006/relationships" xmlns:p1510="http://schemas.microsoft.com/office/powerpoint/2015/10/main">
   <p1510:revLst>
-    <p1510:client id="{92BFB444-7DBC-CA44-A6DD-A4B3F7DBDADB}" v="46" dt="2025-12-26T14:10:48.577"/>
+    <p1510:client id="{92BFB444-7DBC-CA44-A6DD-A4B3F7DBDADB}" v="55" dt="2025-12-26T22:43:32.256"/>
   </p1510:revLst>
 </p1510:revInfo>
 </file>
@@ -3428,6 +3429,186 @@
 </p:sld>
 </file>
 
+<file path=ppt/slides/slide10.xml><?xml version="1.0" encoding="utf-8"?>
+<p:sld xmlns:a="http://schemas.openxmlformats.org/drawingml/2006/main" xmlns:r="http://schemas.openxmlformats.org/officeDocument/2006/relationships" xmlns:p="http://schemas.openxmlformats.org/presentationml/2006/main">
+  <p:cSld>
+    <p:spTree>
+      <p:nvGrpSpPr>
+        <p:cNvPr id="1" name="">
+          <a:extLst>
+            <a:ext uri="{FF2B5EF4-FFF2-40B4-BE49-F238E27FC236}">
+              <a16:creationId xmlns:a16="http://schemas.microsoft.com/office/drawing/2014/main" id="{31E502F0-B295-3CBC-0C07-E4C4618F657C}"/>
+            </a:ext>
+          </a:extLst>
+        </p:cNvPr>
+        <p:cNvGrpSpPr/>
+        <p:nvPr/>
+      </p:nvGrpSpPr>
+      <p:grpSpPr>
+        <a:xfrm>
+          <a:off x="0" y="0"/>
+          <a:ext cx="0" cy="0"/>
+          <a:chOff x="0" y="0"/>
+          <a:chExt cx="0" cy="0"/>
+        </a:xfrm>
+      </p:grpSpPr>
+      <p:sp>
+        <p:nvSpPr>
+          <p:cNvPr id="2" name="Title 1">
+            <a:extLst>
+              <a:ext uri="{FF2B5EF4-FFF2-40B4-BE49-F238E27FC236}">
+                <a16:creationId xmlns:a16="http://schemas.microsoft.com/office/drawing/2014/main" id="{23C5BDF2-9E97-C703-B53F-458CDBB963C7}"/>
+              </a:ext>
+            </a:extLst>
+          </p:cNvPr>
+          <p:cNvSpPr>
+            <a:spLocks noGrp="1"/>
+          </p:cNvSpPr>
+          <p:nvPr>
+            <p:ph type="title"/>
+          </p:nvPr>
+        </p:nvSpPr>
+        <p:spPr/>
+        <p:txBody>
+          <a:bodyPr/>
+          <a:lstStyle/>
+          <a:p>
+            <a:r>
+              <a:rPr lang="en-US" dirty="0"/>
+              <a:t>7</a:t>
+            </a:r>
+            <a:r>
+              <a:rPr lang="en-US" noProof="0" dirty="0"/>
+              <a:t>. Degeneracy</a:t>
+            </a:r>
+          </a:p>
+        </p:txBody>
+      </p:sp>
+      <p:sp>
+        <p:nvSpPr>
+          <p:cNvPr id="9" name="Content Placeholder 2">
+            <a:extLst>
+              <a:ext uri="{FF2B5EF4-FFF2-40B4-BE49-F238E27FC236}">
+                <a16:creationId xmlns:a16="http://schemas.microsoft.com/office/drawing/2014/main" id="{CFC3F66B-5B1C-5DC6-40A2-60B545495C28}"/>
+              </a:ext>
+            </a:extLst>
+          </p:cNvPr>
+          <p:cNvSpPr>
+            <a:spLocks noGrp="1"/>
+          </p:cNvSpPr>
+          <p:nvPr>
+            <p:ph idx="1"/>
+          </p:nvPr>
+        </p:nvSpPr>
+        <p:spPr>
+          <a:xfrm>
+            <a:off x="838200" y="1825625"/>
+            <a:ext cx="10515600" cy="4351338"/>
+          </a:xfrm>
+        </p:spPr>
+        <p:txBody>
+          <a:bodyPr>
+            <a:normAutofit/>
+          </a:bodyPr>
+          <a:lstStyle/>
+          <a:p>
+            <a:pPr marL="0" indent="0">
+              <a:buNone/>
+            </a:pPr>
+            <a:r>
+              <a:rPr lang="en-US" noProof="0" dirty="0"/>
+              <a:t>The package can deal with two types of degeneracy.</a:t>
+            </a:r>
+          </a:p>
+          <a:p>
+            <a:r>
+              <a:rPr lang="en-US" dirty="0"/>
+              <a:t>Type-0 degeneracy (no volume, ‘flat’)</a:t>
+            </a:r>
+          </a:p>
+          <a:p>
+            <a:endParaRPr lang="en-US" dirty="0"/>
+          </a:p>
+          <a:p>
+            <a:pPr marL="0" indent="0">
+              <a:buNone/>
+            </a:pPr>
+            <a:endParaRPr lang="en-US" dirty="0"/>
+          </a:p>
+          <a:p>
+            <a:r>
+              <a:rPr lang="en-US" noProof="0" dirty="0"/>
+              <a:t>Type-∞ degeneracy (infinite volume, ’unbounded’)</a:t>
+            </a:r>
+          </a:p>
+        </p:txBody>
+      </p:sp>
+      <p:sp>
+        <p:nvSpPr>
+          <p:cNvPr id="5" name="TextBox 4">
+            <a:extLst>
+              <a:ext uri="{FF2B5EF4-FFF2-40B4-BE49-F238E27FC236}">
+                <a16:creationId xmlns:a16="http://schemas.microsoft.com/office/drawing/2014/main" id="{427E9B99-D70D-75A2-F074-0FEBC629E012}"/>
+              </a:ext>
+            </a:extLst>
+          </p:cNvPr>
+          <p:cNvSpPr txBox="1"/>
+          <p:nvPr/>
+        </p:nvSpPr>
+        <p:spPr>
+          <a:xfrm>
+            <a:off x="3127432" y="5764044"/>
+            <a:ext cx="5937135" cy="646331"/>
+          </a:xfrm>
+          <a:prstGeom prst="rect">
+            <a:avLst/>
+          </a:prstGeom>
+          <a:solidFill>
+            <a:srgbClr val="EC7246"/>
+          </a:solidFill>
+          <a:ln>
+            <a:noFill/>
+          </a:ln>
+        </p:spPr>
+        <p:txBody>
+          <a:bodyPr wrap="square" rtlCol="0">
+            <a:spAutoFit/>
+          </a:bodyPr>
+          <a:lstStyle/>
+          <a:p>
+            <a:pPr algn="ctr"/>
+            <a:r>
+              <a:rPr lang="en-US" b="1" noProof="0" dirty="0">
+                <a:solidFill>
+                  <a:srgbClr val="FFFFFF"/>
+                </a:solidFill>
+              </a:rPr>
+              <a:t>Challenge: </a:t>
+            </a:r>
+            <a:r>
+              <a:rPr lang="en-US" noProof="0" dirty="0">
+                <a:solidFill>
+                  <a:srgbClr val="FFFFFF"/>
+                </a:solidFill>
+              </a:rPr>
+              <a:t>There are an increasing number of edge-cases to consider when dealing with degeneracy</a:t>
+            </a:r>
+          </a:p>
+        </p:txBody>
+      </p:sp>
+    </p:spTree>
+    <p:extLst>
+      <p:ext uri="{BB962C8B-B14F-4D97-AF65-F5344CB8AC3E}">
+        <p14:creationId xmlns:p14="http://schemas.microsoft.com/office/powerpoint/2010/main" val="290186477"/>
+      </p:ext>
+    </p:extLst>
+  </p:cSld>
+  <p:clrMapOvr>
+    <a:masterClrMapping/>
+  </p:clrMapOvr>
+</p:sld>
+</file>
+
 <file path=ppt/slides/slide2.xml><?xml version="1.0" encoding="utf-8"?>
 <p:sld xmlns:a="http://schemas.openxmlformats.org/drawingml/2006/main" xmlns:r="http://schemas.openxmlformats.org/officeDocument/2006/relationships" xmlns:p="http://schemas.openxmlformats.org/presentationml/2006/main">
   <p:cSld>
@@ -3560,6 +3741,17 @@
               <a:rPr lang="en-US" noProof="0" dirty="0"/>
               <a:t>)</a:t>
             </a:r>
+          </a:p>
+          <a:p>
+            <a:pPr marL="514350" indent="-514350">
+              <a:buFont typeface="+mj-lt"/>
+              <a:buAutoNum type="arabicPeriod"/>
+            </a:pPr>
+            <a:r>
+              <a:rPr lang="en-US" dirty="0"/>
+              <a:t>Degeneracy</a:t>
+            </a:r>
+            <a:endParaRPr lang="en-US" noProof="0" dirty="0"/>
           </a:p>
           <a:p>
             <a:pPr marL="514350" indent="-514350">
@@ -4129,13 +4321,8 @@
             </a:pPr>
             <a:r>
               <a:rPr lang="en-US" noProof="0" dirty="0"/>
-              <a:t>Also, extensive pretty printing and printing formats for the </a:t>
-            </a:r>
-            <a:r>
-              <a:rPr lang="en-US" noProof="0"/>
-              <a:t>different classes.</a:t>
-            </a:r>
-            <a:endParaRPr lang="en-US" noProof="0" dirty="0"/>
+              <a:t>Also, extensive pretty printing and printing formats for the different classes.</a:t>
+            </a:r>
           </a:p>
         </p:txBody>
       </p:sp>

</xml_diff>

<commit_message>
Added a lot of comments to geopes.py about functionality and implementation
</commit_message>
<xml_diff>
--- a/presentation.pptx
+++ b/presentation.pptx
@@ -15,6 +15,9 @@
     <p:sldId id="261" r:id="rId9"/>
     <p:sldId id="263" r:id="rId10"/>
     <p:sldId id="265" r:id="rId11"/>
+    <p:sldId id="266" r:id="rId12"/>
+    <p:sldId id="267" r:id="rId13"/>
+    <p:sldId id="268" r:id="rId14"/>
   </p:sldIdLst>
   <p:sldSz cx="12192000" cy="6858000"/>
   <p:notesSz cx="6858000" cy="9144000"/>
@@ -119,7 +122,7 @@
 <file path=ppt/revisionInfo.xml><?xml version="1.0" encoding="utf-8"?>
 <p1510:revInfo xmlns:a="http://schemas.openxmlformats.org/drawingml/2006/main" xmlns:r="http://schemas.openxmlformats.org/officeDocument/2006/relationships" xmlns:p1510="http://schemas.microsoft.com/office/powerpoint/2015/10/main">
   <p1510:revLst>
-    <p1510:client id="{92BFB444-7DBC-CA44-A6DD-A4B3F7DBDADB}" v="55" dt="2025-12-26T22:43:32.256"/>
+    <p1510:client id="{92BFB444-7DBC-CA44-A6DD-A4B3F7DBDADB}" v="67" dt="2025-12-29T13:23:36.503"/>
   </p1510:revLst>
 </p1510:revInfo>
 </file>
@@ -3474,12 +3477,8 @@
           <a:lstStyle/>
           <a:p>
             <a:r>
-              <a:rPr lang="en-US" dirty="0"/>
-              <a:t>7</a:t>
-            </a:r>
-            <a:r>
-              <a:rPr lang="en-US" noProof="0" dirty="0"/>
-              <a:t>. Degeneracy</a:t>
+              <a:rPr lang="en-US" noProof="0" dirty="0"/>
+              <a:t>7. Degeneracy</a:t>
             </a:r>
           </a:p>
         </p:txBody>
@@ -3522,18 +3521,18 @@
           </a:p>
           <a:p>
             <a:r>
-              <a:rPr lang="en-US" dirty="0"/>
+              <a:rPr lang="en-US" noProof="0" dirty="0"/>
               <a:t>Type-0 degeneracy (no volume, ‘flat’)</a:t>
             </a:r>
           </a:p>
           <a:p>
-            <a:endParaRPr lang="en-US" dirty="0"/>
+            <a:endParaRPr lang="en-US" noProof="0" dirty="0"/>
           </a:p>
           <a:p>
             <a:pPr marL="0" indent="0">
               <a:buNone/>
             </a:pPr>
-            <a:endParaRPr lang="en-US" dirty="0"/>
+            <a:endParaRPr lang="en-US" noProof="0" dirty="0"/>
           </a:p>
           <a:p>
             <a:r>
@@ -3600,6 +3599,469 @@
     <p:extLst>
       <p:ext uri="{BB962C8B-B14F-4D97-AF65-F5344CB8AC3E}">
         <p14:creationId xmlns:p14="http://schemas.microsoft.com/office/powerpoint/2010/main" val="290186477"/>
+      </p:ext>
+    </p:extLst>
+  </p:cSld>
+  <p:clrMapOvr>
+    <a:masterClrMapping/>
+  </p:clrMapOvr>
+</p:sld>
+</file>
+
+<file path=ppt/slides/slide11.xml><?xml version="1.0" encoding="utf-8"?>
+<p:sld xmlns:a="http://schemas.openxmlformats.org/drawingml/2006/main" xmlns:r="http://schemas.openxmlformats.org/officeDocument/2006/relationships" xmlns:p="http://schemas.openxmlformats.org/presentationml/2006/main">
+  <p:cSld>
+    <p:spTree>
+      <p:nvGrpSpPr>
+        <p:cNvPr id="1" name="">
+          <a:extLst>
+            <a:ext uri="{FF2B5EF4-FFF2-40B4-BE49-F238E27FC236}">
+              <a16:creationId xmlns:a16="http://schemas.microsoft.com/office/drawing/2014/main" id="{D804CAF4-2DAF-C6AB-B888-7644A4DBE21E}"/>
+            </a:ext>
+          </a:extLst>
+        </p:cNvPr>
+        <p:cNvGrpSpPr/>
+        <p:nvPr/>
+      </p:nvGrpSpPr>
+      <p:grpSpPr>
+        <a:xfrm>
+          <a:off x="0" y="0"/>
+          <a:ext cx="0" cy="0"/>
+          <a:chOff x="0" y="0"/>
+          <a:chExt cx="0" cy="0"/>
+        </a:xfrm>
+      </p:grpSpPr>
+      <p:sp>
+        <p:nvSpPr>
+          <p:cNvPr id="2" name="Title 1">
+            <a:extLst>
+              <a:ext uri="{FF2B5EF4-FFF2-40B4-BE49-F238E27FC236}">
+                <a16:creationId xmlns:a16="http://schemas.microsoft.com/office/drawing/2014/main" id="{7A5AFF1F-94F9-C91E-2F2F-FFE0FEE7CA84}"/>
+              </a:ext>
+            </a:extLst>
+          </p:cNvPr>
+          <p:cNvSpPr>
+            <a:spLocks noGrp="1"/>
+          </p:cNvSpPr>
+          <p:nvPr>
+            <p:ph type="title"/>
+          </p:nvPr>
+        </p:nvSpPr>
+        <p:spPr/>
+        <p:txBody>
+          <a:bodyPr/>
+          <a:lstStyle/>
+          <a:p>
+            <a:r>
+              <a:rPr lang="en-US" noProof="0" dirty="0"/>
+              <a:t>Why am I seeking collaborators?</a:t>
+            </a:r>
+          </a:p>
+        </p:txBody>
+      </p:sp>
+      <p:sp>
+        <p:nvSpPr>
+          <p:cNvPr id="9" name="Content Placeholder 2">
+            <a:extLst>
+              <a:ext uri="{FF2B5EF4-FFF2-40B4-BE49-F238E27FC236}">
+                <a16:creationId xmlns:a16="http://schemas.microsoft.com/office/drawing/2014/main" id="{6C5CE3AB-56AA-BAEB-3255-F9C89764EF4A}"/>
+              </a:ext>
+            </a:extLst>
+          </p:cNvPr>
+          <p:cNvSpPr>
+            <a:spLocks noGrp="1"/>
+          </p:cNvSpPr>
+          <p:nvPr>
+            <p:ph idx="1"/>
+          </p:nvPr>
+        </p:nvSpPr>
+        <p:spPr>
+          <a:xfrm>
+            <a:off x="838200" y="1825625"/>
+            <a:ext cx="10515600" cy="4351338"/>
+          </a:xfrm>
+        </p:spPr>
+        <p:txBody>
+          <a:bodyPr>
+            <a:normAutofit/>
+          </a:bodyPr>
+          <a:lstStyle/>
+          <a:p>
+            <a:pPr marL="514350" indent="-514350">
+              <a:buFont typeface="+mj-lt"/>
+              <a:buAutoNum type="arabicPeriod"/>
+            </a:pPr>
+            <a:r>
+              <a:rPr lang="en-US" noProof="0" dirty="0"/>
+              <a:t>I want to know which features are desirable (meaning development should be prioritized) from the users: you</a:t>
+            </a:r>
+          </a:p>
+          <a:p>
+            <a:pPr marL="514350" indent="-514350">
+              <a:buFont typeface="+mj-lt"/>
+              <a:buAutoNum type="arabicPeriod"/>
+            </a:pPr>
+            <a:r>
+              <a:rPr lang="en-US" noProof="0" dirty="0"/>
+              <a:t>I want your input/expertise/experience on a wide number of design choices (&gt;50 as of now) in the software architecture.</a:t>
+            </a:r>
+          </a:p>
+          <a:p>
+            <a:pPr marL="514350" indent="-514350">
+              <a:buFont typeface="+mj-lt"/>
+              <a:buAutoNum type="arabicPeriod"/>
+            </a:pPr>
+            <a:r>
+              <a:rPr lang="en-US" noProof="0" dirty="0"/>
+              <a:t>I want your (mathematical) expertise when it comes to certain algorithms concerning polytopes, subspaces, and ellipsoids.</a:t>
+            </a:r>
+          </a:p>
+          <a:p>
+            <a:pPr marL="514350" indent="-514350">
+              <a:buFont typeface="+mj-lt"/>
+              <a:buAutoNum type="arabicPeriod"/>
+            </a:pPr>
+            <a:r>
+              <a:rPr lang="en-US" noProof="0" dirty="0"/>
+              <a:t>I would need to split the (ever-growing) workload of writing all functionalities to make this </a:t>
+            </a:r>
+            <a:r>
+              <a:rPr lang="en-US" noProof="0"/>
+              <a:t>toolbox </a:t>
+            </a:r>
+            <a:r>
+              <a:rPr lang="en-US" i="1" noProof="0"/>
+              <a:t>fully-fledged</a:t>
+            </a:r>
+            <a:r>
+              <a:rPr lang="en-US" noProof="0" dirty="0"/>
+              <a:t>.</a:t>
+            </a:r>
+          </a:p>
+        </p:txBody>
+      </p:sp>
+    </p:spTree>
+    <p:extLst>
+      <p:ext uri="{BB962C8B-B14F-4D97-AF65-F5344CB8AC3E}">
+        <p14:creationId xmlns:p14="http://schemas.microsoft.com/office/powerpoint/2010/main" val="674560181"/>
+      </p:ext>
+    </p:extLst>
+  </p:cSld>
+  <p:clrMapOvr>
+    <a:masterClrMapping/>
+  </p:clrMapOvr>
+</p:sld>
+</file>
+
+<file path=ppt/slides/slide12.xml><?xml version="1.0" encoding="utf-8"?>
+<p:sld xmlns:a="http://schemas.openxmlformats.org/drawingml/2006/main" xmlns:r="http://schemas.openxmlformats.org/officeDocument/2006/relationships" xmlns:p="http://schemas.openxmlformats.org/presentationml/2006/main">
+  <p:cSld>
+    <p:spTree>
+      <p:nvGrpSpPr>
+        <p:cNvPr id="1" name="">
+          <a:extLst>
+            <a:ext uri="{FF2B5EF4-FFF2-40B4-BE49-F238E27FC236}">
+              <a16:creationId xmlns:a16="http://schemas.microsoft.com/office/drawing/2014/main" id="{AF908C3E-1553-4299-AD09-B44A857EF0A6}"/>
+            </a:ext>
+          </a:extLst>
+        </p:cNvPr>
+        <p:cNvGrpSpPr/>
+        <p:nvPr/>
+      </p:nvGrpSpPr>
+      <p:grpSpPr>
+        <a:xfrm>
+          <a:off x="0" y="0"/>
+          <a:ext cx="0" cy="0"/>
+          <a:chOff x="0" y="0"/>
+          <a:chExt cx="0" cy="0"/>
+        </a:xfrm>
+      </p:grpSpPr>
+      <p:sp>
+        <p:nvSpPr>
+          <p:cNvPr id="2" name="Title 1">
+            <a:extLst>
+              <a:ext uri="{FF2B5EF4-FFF2-40B4-BE49-F238E27FC236}">
+                <a16:creationId xmlns:a16="http://schemas.microsoft.com/office/drawing/2014/main" id="{41AAC7F8-4717-800F-1167-E97B7F5FBEBE}"/>
+              </a:ext>
+            </a:extLst>
+          </p:cNvPr>
+          <p:cNvSpPr>
+            <a:spLocks noGrp="1"/>
+          </p:cNvSpPr>
+          <p:nvPr>
+            <p:ph type="title"/>
+          </p:nvPr>
+        </p:nvSpPr>
+        <p:spPr/>
+        <p:txBody>
+          <a:bodyPr/>
+          <a:lstStyle/>
+          <a:p>
+            <a:r>
+              <a:rPr lang="en-US" noProof="0" dirty="0"/>
+              <a:t>What do I get in return?</a:t>
+            </a:r>
+          </a:p>
+        </p:txBody>
+      </p:sp>
+      <p:sp>
+        <p:nvSpPr>
+          <p:cNvPr id="9" name="Content Placeholder 2">
+            <a:extLst>
+              <a:ext uri="{FF2B5EF4-FFF2-40B4-BE49-F238E27FC236}">
+                <a16:creationId xmlns:a16="http://schemas.microsoft.com/office/drawing/2014/main" id="{A8F04E1F-D9F7-6017-DA7A-5C0C6EBEDBF5}"/>
+              </a:ext>
+            </a:extLst>
+          </p:cNvPr>
+          <p:cNvSpPr>
+            <a:spLocks noGrp="1"/>
+          </p:cNvSpPr>
+          <p:nvPr>
+            <p:ph idx="1"/>
+          </p:nvPr>
+        </p:nvSpPr>
+        <p:spPr>
+          <a:xfrm>
+            <a:off x="838200" y="1825625"/>
+            <a:ext cx="10515600" cy="4351338"/>
+          </a:xfrm>
+        </p:spPr>
+        <p:txBody>
+          <a:bodyPr>
+            <a:normAutofit/>
+          </a:bodyPr>
+          <a:lstStyle/>
+          <a:p>
+            <a:pPr marL="0" indent="0">
+              <a:buNone/>
+            </a:pPr>
+            <a:r>
+              <a:rPr lang="en-US" noProof="0" dirty="0"/>
+              <a:t>Well… not much! But:</a:t>
+            </a:r>
+          </a:p>
+          <a:p>
+            <a:pPr marL="514350" indent="-514350">
+              <a:buFont typeface="+mj-lt"/>
+              <a:buAutoNum type="arabicPeriod"/>
+            </a:pPr>
+            <a:r>
+              <a:rPr lang="en-US" noProof="0" dirty="0"/>
+              <a:t>A fun (hopefully, satisfactory) side-project in Python. Extensive (CV-worthy) expertise in Python package coding.</a:t>
+            </a:r>
+          </a:p>
+          <a:p>
+            <a:pPr marL="514350" indent="-514350">
+              <a:buFont typeface="+mj-lt"/>
+              <a:buAutoNum type="arabicPeriod"/>
+            </a:pPr>
+            <a:r>
+              <a:rPr lang="en-US" noProof="0" dirty="0"/>
+              <a:t>Experience in collaborating with others on a software project.</a:t>
+            </a:r>
+          </a:p>
+          <a:p>
+            <a:pPr marL="514350" indent="-514350">
+              <a:buFont typeface="+mj-lt"/>
+              <a:buAutoNum type="arabicPeriod"/>
+            </a:pPr>
+            <a:r>
+              <a:rPr lang="en-US" dirty="0"/>
+              <a:t>In the long run, a useful toolbox you can also use in your own projects/publications.</a:t>
+            </a:r>
+          </a:p>
+          <a:p>
+            <a:pPr marL="514350" indent="-514350">
+              <a:buFont typeface="+mj-lt"/>
+              <a:buAutoNum type="arabicPeriod"/>
+            </a:pPr>
+            <a:r>
+              <a:rPr lang="en-US" noProof="0" dirty="0"/>
+              <a:t>Added to the list of contributors for </a:t>
+            </a:r>
+            <a:r>
+              <a:rPr lang="en-US" noProof="0" dirty="0" err="1"/>
+              <a:t>GeoPES</a:t>
+            </a:r>
+            <a:r>
+              <a:rPr lang="en-US" noProof="0" dirty="0"/>
+              <a:t>.</a:t>
+            </a:r>
+          </a:p>
+          <a:p>
+            <a:pPr marL="514350" indent="-514350">
+              <a:buFont typeface="+mj-lt"/>
+              <a:buAutoNum type="arabicPeriod"/>
+            </a:pPr>
+            <a:r>
+              <a:rPr lang="en-US" dirty="0"/>
+              <a:t>If it comes to it (no guarantees): one of the authors on the (conference) publication promoting/launching </a:t>
+            </a:r>
+            <a:r>
+              <a:rPr lang="en-US" dirty="0" err="1"/>
+              <a:t>GeoPES</a:t>
+            </a:r>
+            <a:r>
+              <a:rPr lang="en-US" dirty="0"/>
+              <a:t>.</a:t>
+            </a:r>
+            <a:endParaRPr lang="en-US" noProof="0" dirty="0"/>
+          </a:p>
+        </p:txBody>
+      </p:sp>
+    </p:spTree>
+    <p:extLst>
+      <p:ext uri="{BB962C8B-B14F-4D97-AF65-F5344CB8AC3E}">
+        <p14:creationId xmlns:p14="http://schemas.microsoft.com/office/powerpoint/2010/main" val="74253125"/>
+      </p:ext>
+    </p:extLst>
+  </p:cSld>
+  <p:clrMapOvr>
+    <a:masterClrMapping/>
+  </p:clrMapOvr>
+</p:sld>
+</file>
+
+<file path=ppt/slides/slide13.xml><?xml version="1.0" encoding="utf-8"?>
+<p:sld xmlns:a="http://schemas.openxmlformats.org/drawingml/2006/main" xmlns:r="http://schemas.openxmlformats.org/officeDocument/2006/relationships" xmlns:p="http://schemas.openxmlformats.org/presentationml/2006/main">
+  <p:cSld>
+    <p:spTree>
+      <p:nvGrpSpPr>
+        <p:cNvPr id="1" name="">
+          <a:extLst>
+            <a:ext uri="{FF2B5EF4-FFF2-40B4-BE49-F238E27FC236}">
+              <a16:creationId xmlns:a16="http://schemas.microsoft.com/office/drawing/2014/main" id="{8966D5EC-5849-84DD-2213-ACC764B4A713}"/>
+            </a:ext>
+          </a:extLst>
+        </p:cNvPr>
+        <p:cNvGrpSpPr/>
+        <p:nvPr/>
+      </p:nvGrpSpPr>
+      <p:grpSpPr>
+        <a:xfrm>
+          <a:off x="0" y="0"/>
+          <a:ext cx="0" cy="0"/>
+          <a:chOff x="0" y="0"/>
+          <a:chExt cx="0" cy="0"/>
+        </a:xfrm>
+      </p:grpSpPr>
+      <p:sp>
+        <p:nvSpPr>
+          <p:cNvPr id="2" name="Title 1">
+            <a:extLst>
+              <a:ext uri="{FF2B5EF4-FFF2-40B4-BE49-F238E27FC236}">
+                <a16:creationId xmlns:a16="http://schemas.microsoft.com/office/drawing/2014/main" id="{848B413F-C874-CAD7-D7D6-4B329A93B753}"/>
+              </a:ext>
+            </a:extLst>
+          </p:cNvPr>
+          <p:cNvSpPr>
+            <a:spLocks noGrp="1"/>
+          </p:cNvSpPr>
+          <p:nvPr>
+            <p:ph type="title"/>
+          </p:nvPr>
+        </p:nvSpPr>
+        <p:spPr/>
+        <p:txBody>
+          <a:bodyPr/>
+          <a:lstStyle/>
+          <a:p>
+            <a:r>
+              <a:rPr lang="en-US" dirty="0"/>
+              <a:t>How much do I need to be involved?</a:t>
+            </a:r>
+            <a:endParaRPr lang="en-US" noProof="0" dirty="0"/>
+          </a:p>
+        </p:txBody>
+      </p:sp>
+      <p:sp>
+        <p:nvSpPr>
+          <p:cNvPr id="9" name="Content Placeholder 2">
+            <a:extLst>
+              <a:ext uri="{FF2B5EF4-FFF2-40B4-BE49-F238E27FC236}">
+                <a16:creationId xmlns:a16="http://schemas.microsoft.com/office/drawing/2014/main" id="{811FDD46-8F60-1468-B695-89FE9FC079DF}"/>
+              </a:ext>
+            </a:extLst>
+          </p:cNvPr>
+          <p:cNvSpPr>
+            <a:spLocks noGrp="1"/>
+          </p:cNvSpPr>
+          <p:nvPr>
+            <p:ph idx="1"/>
+          </p:nvPr>
+        </p:nvSpPr>
+        <p:spPr>
+          <a:xfrm>
+            <a:off x="838200" y="1825625"/>
+            <a:ext cx="10515600" cy="4351338"/>
+          </a:xfrm>
+        </p:spPr>
+        <p:txBody>
+          <a:bodyPr>
+            <a:normAutofit fontScale="92500" lnSpcReduction="20000"/>
+          </a:bodyPr>
+          <a:lstStyle/>
+          <a:p>
+            <a:pPr marL="0" indent="0">
+              <a:buNone/>
+            </a:pPr>
+            <a:r>
+              <a:rPr lang="en-US" noProof="0" dirty="0"/>
+              <a:t>Depends entirely on you. You could:</a:t>
+            </a:r>
+          </a:p>
+          <a:p>
+            <a:r>
+              <a:rPr lang="en-US" noProof="0" dirty="0"/>
+              <a:t>Not writing a </a:t>
+            </a:r>
+            <a:r>
+              <a:rPr lang="en-US" dirty="0"/>
+              <a:t>single line of code, maybe have two chats about interesting math you read/suggestions for functionality.</a:t>
+            </a:r>
+          </a:p>
+          <a:p>
+            <a:r>
+              <a:rPr lang="en-US" noProof="0" dirty="0"/>
+              <a:t>I have some old MATLAB/Python code lying around somewhere; you can have a look at that. Otherwise, don’t call me again!</a:t>
+            </a:r>
+          </a:p>
+          <a:p>
+            <a:r>
+              <a:rPr lang="en-US" dirty="0"/>
+              <a:t>Sounds fun! I don’t know if I can make any commitment on time, though… I might read through some of the design decisions, leave some thoughts, attend a future meeting, but no promises. </a:t>
+            </a:r>
+          </a:p>
+          <a:p>
+            <a:r>
+              <a:rPr lang="en-US" noProof="0" dirty="0"/>
+              <a:t>Might actually be quite nice to join, also to gain a lot of coding experience; I’d be down to have some more </a:t>
+            </a:r>
+            <a:r>
+              <a:rPr lang="en-US" noProof="0" dirty="0" err="1"/>
+              <a:t>indepth</a:t>
+            </a:r>
+            <a:r>
+              <a:rPr lang="en-US" noProof="0" dirty="0"/>
+              <a:t> discussion, see if there’s certain functionality/subtask I’d be interested in writing.</a:t>
+            </a:r>
+          </a:p>
+          <a:p>
+            <a:r>
+              <a:rPr lang="en-US" dirty="0"/>
+              <a:t>…</a:t>
+            </a:r>
+            <a:endParaRPr lang="en-US" noProof="0" dirty="0"/>
+          </a:p>
+          <a:p>
+            <a:endParaRPr lang="en-US" noProof="0" dirty="0"/>
+          </a:p>
+        </p:txBody>
+      </p:sp>
+    </p:spTree>
+    <p:extLst>
+      <p:ext uri="{BB962C8B-B14F-4D97-AF65-F5344CB8AC3E}">
+        <p14:creationId xmlns:p14="http://schemas.microsoft.com/office/powerpoint/2010/main" val="2359103675"/>
       </p:ext>
     </p:extLst>
   </p:cSld>
@@ -3748,10 +4210,9 @@
               <a:buAutoNum type="arabicPeriod"/>
             </a:pPr>
             <a:r>
-              <a:rPr lang="en-US" dirty="0"/>
+              <a:rPr lang="en-US" noProof="0" dirty="0"/>
               <a:t>Degeneracy</a:t>
             </a:r>
-            <a:endParaRPr lang="en-US" noProof="0" dirty="0"/>
           </a:p>
           <a:p>
             <a:pPr marL="514350" indent="-514350">
@@ -4905,12 +5366,8 @@
           </a:p>
           <a:p>
             <a:r>
-              <a:rPr lang="en-US" dirty="0"/>
-              <a:t>c</a:t>
-            </a:r>
-            <a:r>
               <a:rPr lang="en-US" noProof="0" dirty="0" err="1"/>
-              <a:t>vxpy</a:t>
+              <a:t>cvxpy</a:t>
             </a:r>
             <a:r>
               <a:rPr lang="en-US" noProof="0" dirty="0"/>

</xml_diff>

<commit_message>
Added test for ellipsoid volume computation based on degeneracy. Updated presentation
</commit_message>
<xml_diff>
--- a/presentation.pptx
+++ b/presentation.pptx
@@ -8,16 +8,17 @@
     <p:sldId id="256" r:id="rId2"/>
     <p:sldId id="257" r:id="rId3"/>
     <p:sldId id="258" r:id="rId4"/>
-    <p:sldId id="259" r:id="rId5"/>
-    <p:sldId id="264" r:id="rId6"/>
-    <p:sldId id="262" r:id="rId7"/>
-    <p:sldId id="260" r:id="rId8"/>
-    <p:sldId id="261" r:id="rId9"/>
-    <p:sldId id="263" r:id="rId10"/>
-    <p:sldId id="265" r:id="rId11"/>
-    <p:sldId id="266" r:id="rId12"/>
-    <p:sldId id="267" r:id="rId13"/>
-    <p:sldId id="268" r:id="rId14"/>
+    <p:sldId id="269" r:id="rId5"/>
+    <p:sldId id="259" r:id="rId6"/>
+    <p:sldId id="264" r:id="rId7"/>
+    <p:sldId id="262" r:id="rId8"/>
+    <p:sldId id="265" r:id="rId9"/>
+    <p:sldId id="261" r:id="rId10"/>
+    <p:sldId id="263" r:id="rId11"/>
+    <p:sldId id="260" r:id="rId12"/>
+    <p:sldId id="266" r:id="rId13"/>
+    <p:sldId id="267" r:id="rId14"/>
+    <p:sldId id="268" r:id="rId15"/>
   </p:sldIdLst>
   <p:sldSz cx="12192000" cy="6858000"/>
   <p:notesSz cx="6858000" cy="9144000"/>
@@ -122,7 +123,7 @@
 <file path=ppt/revisionInfo.xml><?xml version="1.0" encoding="utf-8"?>
 <p1510:revInfo xmlns:a="http://schemas.openxmlformats.org/drawingml/2006/main" xmlns:r="http://schemas.openxmlformats.org/officeDocument/2006/relationships" xmlns:p1510="http://schemas.microsoft.com/office/powerpoint/2015/10/main">
   <p1510:revLst>
-    <p1510:client id="{92BFB444-7DBC-CA44-A6DD-A4B3F7DBDADB}" v="67" dt="2025-12-29T13:23:36.503"/>
+    <p1510:client id="{92BFB444-7DBC-CA44-A6DD-A4B3F7DBDADB}" v="88" dt="2026-01-02T14:56:51.510"/>
   </p1510:revLst>
 </p1510:revInfo>
 </file>
@@ -3414,7 +3415,15 @@
           <a:p>
             <a:r>
               <a:rPr lang="en-US" noProof="0" dirty="0"/>
-              <a:t>A control-oriented Python package emulation numeric types of polytopes, ellipsoids, and subspaces.</a:t>
+              <a:t>A control-oriented Python package emulation numeric </a:t>
+            </a:r>
+            <a:r>
+              <a:rPr lang="en-US" noProof="0"/>
+              <a:t>types for </a:t>
+            </a:r>
+            <a:r>
+              <a:rPr lang="en-US" noProof="0" dirty="0"/>
+              <a:t>polytopes, ellipsoids, and subspaces.</a:t>
             </a:r>
           </a:p>
         </p:txBody>
@@ -3440,7 +3449,7 @@
         <p:cNvPr id="1" name="">
           <a:extLst>
             <a:ext uri="{FF2B5EF4-FFF2-40B4-BE49-F238E27FC236}">
-              <a16:creationId xmlns:a16="http://schemas.microsoft.com/office/drawing/2014/main" id="{31E502F0-B295-3CBC-0C07-E4C4618F657C}"/>
+              <a16:creationId xmlns:a16="http://schemas.microsoft.com/office/drawing/2014/main" id="{644443AF-D87D-72C4-C0B5-43B921A837C5}"/>
             </a:ext>
           </a:extLst>
         </p:cNvPr>
@@ -3460,7 +3469,7 @@
           <p:cNvPr id="2" name="Title 1">
             <a:extLst>
               <a:ext uri="{FF2B5EF4-FFF2-40B4-BE49-F238E27FC236}">
-                <a16:creationId xmlns:a16="http://schemas.microsoft.com/office/drawing/2014/main" id="{23C5BDF2-9E97-C703-B53F-458CDBB963C7}"/>
+                <a16:creationId xmlns:a16="http://schemas.microsoft.com/office/drawing/2014/main" id="{A71E7113-CCF9-8A13-4E22-BF2A99CFA936}"/>
               </a:ext>
             </a:extLst>
           </p:cNvPr>
@@ -3478,7 +3487,7 @@
           <a:p>
             <a:r>
               <a:rPr lang="en-US" noProof="0" dirty="0"/>
-              <a:t>7. Degeneracy</a:t>
+              <a:t>6. External libraries integration</a:t>
             </a:r>
           </a:p>
         </p:txBody>
@@ -3488,7 +3497,7 @@
           <p:cNvPr id="9" name="Content Placeholder 2">
             <a:extLst>
               <a:ext uri="{FF2B5EF4-FFF2-40B4-BE49-F238E27FC236}">
-                <a16:creationId xmlns:a16="http://schemas.microsoft.com/office/drawing/2014/main" id="{CFC3F66B-5B1C-5DC6-40A2-60B545495C28}"/>
+                <a16:creationId xmlns:a16="http://schemas.microsoft.com/office/drawing/2014/main" id="{0D51A29D-AE98-D7FA-EE99-8D99F651549E}"/>
               </a:ext>
             </a:extLst>
           </p:cNvPr>
@@ -3516,89 +3525,55 @@
             </a:pPr>
             <a:r>
               <a:rPr lang="en-US" noProof="0" dirty="0"/>
-              <a:t>The package can deal with two types of degeneracy.</a:t>
-            </a:r>
-          </a:p>
-          <a:p>
+              <a:t>The toolbox has special integration features with external libraries.</a:t>
+            </a:r>
+          </a:p>
+          <a:p>
+            <a:r>
+              <a:rPr lang="en-US" noProof="0" dirty="0" err="1"/>
+              <a:t>cvxpy</a:t>
+            </a:r>
             <a:r>
               <a:rPr lang="en-US" noProof="0" dirty="0"/>
-              <a:t>Type-0 degeneracy (no volume, ‘flat’)</a:t>
-            </a:r>
-          </a:p>
-          <a:p>
-            <a:endParaRPr lang="en-US" noProof="0" dirty="0"/>
-          </a:p>
-          <a:p>
-            <a:pPr marL="0" indent="0">
-              <a:buNone/>
-            </a:pPr>
-            <a:endParaRPr lang="en-US" noProof="0" dirty="0"/>
-          </a:p>
-          <a:p>
-            <a:r>
-              <a:rPr lang="en-US" noProof="0" dirty="0"/>
-              <a:t>Type-∞ degeneracy (infinite volume, ’unbounded’)</a:t>
-            </a:r>
-          </a:p>
-        </p:txBody>
-      </p:sp>
-      <p:sp>
-        <p:nvSpPr>
-          <p:cNvPr id="5" name="TextBox 4">
-            <a:extLst>
-              <a:ext uri="{FF2B5EF4-FFF2-40B4-BE49-F238E27FC236}">
-                <a16:creationId xmlns:a16="http://schemas.microsoft.com/office/drawing/2014/main" id="{427E9B99-D70D-75A2-F074-0FEBC629E012}"/>
-              </a:ext>
-            </a:extLst>
-          </p:cNvPr>
-          <p:cNvSpPr txBox="1"/>
+              <a:t>: used for internal optimization and external convex optimization problems formulation.</a:t>
+            </a:r>
+          </a:p>
+        </p:txBody>
+      </p:sp>
+      <p:pic>
+        <p:nvPicPr>
+          <p:cNvPr id="3" name="Picture 2">
+            <a:extLst>
+              <a:ext uri="{FF2B5EF4-FFF2-40B4-BE49-F238E27FC236}">
+                <a16:creationId xmlns:a16="http://schemas.microsoft.com/office/drawing/2014/main" id="{A1640261-66E3-4718-6FCF-FF62042E2B70}"/>
+              </a:ext>
+            </a:extLst>
+          </p:cNvPr>
+          <p:cNvPicPr>
+            <a:picLocks noChangeAspect="1"/>
+          </p:cNvPicPr>
           <p:nvPr/>
-        </p:nvSpPr>
+        </p:nvPicPr>
+        <p:blipFill>
+          <a:blip r:embed="rId2"/>
+          <a:stretch>
+            <a:fillRect/>
+          </a:stretch>
+        </p:blipFill>
         <p:spPr>
           <a:xfrm>
-            <a:off x="3127432" y="5764044"/>
-            <a:ext cx="5937135" cy="646331"/>
+            <a:off x="1755011" y="3325098"/>
+            <a:ext cx="8681977" cy="832904"/>
           </a:xfrm>
           <a:prstGeom prst="rect">
             <a:avLst/>
           </a:prstGeom>
-          <a:solidFill>
-            <a:srgbClr val="EC7246"/>
-          </a:solidFill>
-          <a:ln>
-            <a:noFill/>
-          </a:ln>
         </p:spPr>
-        <p:txBody>
-          <a:bodyPr wrap="square" rtlCol="0">
-            <a:spAutoFit/>
-          </a:bodyPr>
-          <a:lstStyle/>
-          <a:p>
-            <a:pPr algn="ctr"/>
-            <a:r>
-              <a:rPr lang="en-US" b="1" noProof="0" dirty="0">
-                <a:solidFill>
-                  <a:srgbClr val="FFFFFF"/>
-                </a:solidFill>
-              </a:rPr>
-              <a:t>Challenge: </a:t>
-            </a:r>
-            <a:r>
-              <a:rPr lang="en-US" noProof="0" dirty="0">
-                <a:solidFill>
-                  <a:srgbClr val="FFFFFF"/>
-                </a:solidFill>
-              </a:rPr>
-              <a:t>There are an increasing number of edge-cases to consider when dealing with degeneracy</a:t>
-            </a:r>
-          </a:p>
-        </p:txBody>
-      </p:sp>
+      </p:pic>
     </p:spTree>
     <p:extLst>
       <p:ext uri="{BB962C8B-B14F-4D97-AF65-F5344CB8AC3E}">
-        <p14:creationId xmlns:p14="http://schemas.microsoft.com/office/powerpoint/2010/main" val="290186477"/>
+        <p14:creationId xmlns:p14="http://schemas.microsoft.com/office/powerpoint/2010/main" val="3078444715"/>
       </p:ext>
     </p:extLst>
   </p:cSld>
@@ -3609,6 +3584,205 @@
 </file>
 
 <file path=ppt/slides/slide11.xml><?xml version="1.0" encoding="utf-8"?>
+<p:sld xmlns:a="http://schemas.openxmlformats.org/drawingml/2006/main" xmlns:r="http://schemas.openxmlformats.org/officeDocument/2006/relationships" xmlns:p="http://schemas.openxmlformats.org/presentationml/2006/main">
+  <p:cSld>
+    <p:spTree>
+      <p:nvGrpSpPr>
+        <p:cNvPr id="1" name="">
+          <a:extLst>
+            <a:ext uri="{FF2B5EF4-FFF2-40B4-BE49-F238E27FC236}">
+              <a16:creationId xmlns:a16="http://schemas.microsoft.com/office/drawing/2014/main" id="{5ECC968A-2FF9-EEF0-AD71-4287E96866EF}"/>
+            </a:ext>
+          </a:extLst>
+        </p:cNvPr>
+        <p:cNvGrpSpPr/>
+        <p:nvPr/>
+      </p:nvGrpSpPr>
+      <p:grpSpPr>
+        <a:xfrm>
+          <a:off x="0" y="0"/>
+          <a:ext cx="0" cy="0"/>
+          <a:chOff x="0" y="0"/>
+          <a:chExt cx="0" cy="0"/>
+        </a:xfrm>
+      </p:grpSpPr>
+      <p:sp>
+        <p:nvSpPr>
+          <p:cNvPr id="2" name="Title 1">
+            <a:extLst>
+              <a:ext uri="{FF2B5EF4-FFF2-40B4-BE49-F238E27FC236}">
+                <a16:creationId xmlns:a16="http://schemas.microsoft.com/office/drawing/2014/main" id="{3E179F48-7165-7991-F11F-8BC1A9748973}"/>
+              </a:ext>
+            </a:extLst>
+          </p:cNvPr>
+          <p:cNvSpPr>
+            <a:spLocks noGrp="1"/>
+          </p:cNvSpPr>
+          <p:nvPr>
+            <p:ph type="title"/>
+          </p:nvPr>
+        </p:nvSpPr>
+        <p:spPr/>
+        <p:txBody>
+          <a:bodyPr/>
+          <a:lstStyle/>
+          <a:p>
+            <a:r>
+              <a:rPr lang="en-US" noProof="0" dirty="0"/>
+              <a:t>7. Lazy evaluation/loading</a:t>
+            </a:r>
+          </a:p>
+        </p:txBody>
+      </p:sp>
+      <p:sp>
+        <p:nvSpPr>
+          <p:cNvPr id="9" name="Content Placeholder 2">
+            <a:extLst>
+              <a:ext uri="{FF2B5EF4-FFF2-40B4-BE49-F238E27FC236}">
+                <a16:creationId xmlns:a16="http://schemas.microsoft.com/office/drawing/2014/main" id="{EDA5731D-E44C-09F3-F516-2CA8FBB0E8C1}"/>
+              </a:ext>
+            </a:extLst>
+          </p:cNvPr>
+          <p:cNvSpPr>
+            <a:spLocks noGrp="1"/>
+          </p:cNvSpPr>
+          <p:nvPr>
+            <p:ph idx="1"/>
+          </p:nvPr>
+        </p:nvSpPr>
+        <p:spPr>
+          <a:xfrm>
+            <a:off x="838200" y="1825625"/>
+            <a:ext cx="10515600" cy="4351338"/>
+          </a:xfrm>
+        </p:spPr>
+        <p:txBody>
+          <a:bodyPr>
+            <a:normAutofit/>
+          </a:bodyPr>
+          <a:lstStyle/>
+          <a:p>
+            <a:pPr marL="571500" indent="-571500">
+              <a:buFont typeface="+mj-lt"/>
+              <a:buAutoNum type="romanUcPeriod"/>
+            </a:pPr>
+            <a:r>
+              <a:rPr lang="en-US" noProof="0" dirty="0"/>
+              <a:t>Certain properties (i.e., </a:t>
+            </a:r>
+            <a:r>
+              <a:rPr lang="en-US" noProof="0" dirty="0" err="1"/>
+              <a:t>poly.vol</a:t>
+            </a:r>
+            <a:r>
+              <a:rPr lang="en-US" noProof="0" dirty="0"/>
+              <a:t>) are expensive to calculate. These properties are not calculated at object initialization, but only when the ‘attribute’ is accessed (and then, they are saved to the object).</a:t>
+            </a:r>
+          </a:p>
+          <a:p>
+            <a:pPr lvl="1"/>
+            <a:r>
+              <a:rPr lang="en-US" noProof="0" dirty="0"/>
+              <a:t>Same for H-</a:t>
+            </a:r>
+            <a:r>
+              <a:rPr lang="en-US" noProof="0" dirty="0" err="1"/>
+              <a:t>repr</a:t>
+            </a:r>
+            <a:r>
+              <a:rPr lang="en-US" noProof="0" dirty="0"/>
+              <a:t> and V-</a:t>
+            </a:r>
+            <a:r>
+              <a:rPr lang="en-US" noProof="0" dirty="0" err="1"/>
+              <a:t>repr</a:t>
+            </a:r>
+            <a:r>
+              <a:rPr lang="en-US" noProof="0" dirty="0"/>
+              <a:t> of a polytope.</a:t>
+            </a:r>
+          </a:p>
+          <a:p>
+            <a:pPr marL="571500" indent="-571500">
+              <a:buFont typeface="+mj-lt"/>
+              <a:buAutoNum type="romanUcPeriod"/>
+            </a:pPr>
+            <a:r>
+              <a:rPr lang="en-US" noProof="0" dirty="0"/>
+              <a:t>Certain packages (e.g., matplotlib/</a:t>
+            </a:r>
+            <a:r>
+              <a:rPr lang="en-US" noProof="0" dirty="0" err="1"/>
+              <a:t>cvxpy</a:t>
+            </a:r>
+            <a:r>
+              <a:rPr lang="en-US" noProof="0" dirty="0"/>
+              <a:t>) are optional dependencies. These are only imported when called.</a:t>
+            </a:r>
+          </a:p>
+          <a:p>
+            <a:pPr lvl="1"/>
+            <a:r>
+              <a:rPr lang="en-US" noProof="0" dirty="0"/>
+              <a:t>Might create a marginal speed-up.</a:t>
+            </a:r>
+          </a:p>
+          <a:p>
+            <a:pPr lvl="1"/>
+            <a:r>
+              <a:rPr lang="en-US" noProof="0" dirty="0"/>
+              <a:t>The least possible amount of dependencies -&gt; improves longevity.</a:t>
+            </a:r>
+          </a:p>
+          <a:p>
+            <a:endParaRPr lang="en-US" noProof="0" dirty="0"/>
+          </a:p>
+        </p:txBody>
+      </p:sp>
+      <p:pic>
+        <p:nvPicPr>
+          <p:cNvPr id="3" name="Picture 2">
+            <a:extLst>
+              <a:ext uri="{FF2B5EF4-FFF2-40B4-BE49-F238E27FC236}">
+                <a16:creationId xmlns:a16="http://schemas.microsoft.com/office/drawing/2014/main" id="{82009382-CC2F-76DB-A9A7-2CD6A9F9E101}"/>
+              </a:ext>
+            </a:extLst>
+          </p:cNvPr>
+          <p:cNvPicPr>
+            <a:picLocks noChangeAspect="1"/>
+          </p:cNvPicPr>
+          <p:nvPr/>
+        </p:nvPicPr>
+        <p:blipFill>
+          <a:blip r:embed="rId2"/>
+          <a:stretch>
+            <a:fillRect/>
+          </a:stretch>
+        </p:blipFill>
+        <p:spPr>
+          <a:xfrm>
+            <a:off x="2425700" y="5707063"/>
+            <a:ext cx="7340600" cy="939800"/>
+          </a:xfrm>
+          <a:prstGeom prst="rect">
+            <a:avLst/>
+          </a:prstGeom>
+        </p:spPr>
+      </p:pic>
+    </p:spTree>
+    <p:extLst>
+      <p:ext uri="{BB962C8B-B14F-4D97-AF65-F5344CB8AC3E}">
+        <p14:creationId xmlns:p14="http://schemas.microsoft.com/office/powerpoint/2010/main" val="2565428227"/>
+      </p:ext>
+    </p:extLst>
+  </p:cSld>
+  <p:clrMapOvr>
+    <a:masterClrMapping/>
+  </p:clrMapOvr>
+</p:sld>
+</file>
+
+<file path=ppt/slides/slide12.xml><?xml version="1.0" encoding="utf-8"?>
 <p:sld xmlns:a="http://schemas.openxmlformats.org/drawingml/2006/main" xmlns:r="http://schemas.openxmlformats.org/officeDocument/2006/relationships" xmlns:p="http://schemas.openxmlformats.org/presentationml/2006/main">
   <p:cSld>
     <p:spTree>
@@ -3723,14 +3897,10 @@
             </a:pPr>
             <a:r>
               <a:rPr lang="en-US" noProof="0" dirty="0"/>
-              <a:t>I would need to split the (ever-growing) workload of writing all functionalities to make this </a:t>
-            </a:r>
-            <a:r>
-              <a:rPr lang="en-US" noProof="0"/>
-              <a:t>toolbox </a:t>
-            </a:r>
-            <a:r>
-              <a:rPr lang="en-US" i="1" noProof="0"/>
+              <a:t>I would need to split the (ever-growing) workload of writing all functionalities to make this toolbox </a:t>
+            </a:r>
+            <a:r>
+              <a:rPr lang="en-US" i="1" noProof="0" dirty="0"/>
               <a:t>fully-fledged</a:t>
             </a:r>
             <a:r>
@@ -3753,7 +3923,7 @@
 </p:sld>
 </file>
 
-<file path=ppt/slides/slide12.xml><?xml version="1.0" encoding="utf-8"?>
+<file path=ppt/slides/slide13.xml><?xml version="1.0" encoding="utf-8"?>
 <p:sld xmlns:a="http://schemas.openxmlformats.org/drawingml/2006/main" xmlns:r="http://schemas.openxmlformats.org/officeDocument/2006/relationships" xmlns:p="http://schemas.openxmlformats.org/presentationml/2006/main">
   <p:cSld>
     <p:spTree>
@@ -3922,7 +4092,7 @@
 </p:sld>
 </file>
 
-<file path=ppt/slides/slide13.xml><?xml version="1.0" encoding="utf-8"?>
+<file path=ppt/slides/slide14.xml><?xml version="1.0" encoding="utf-8"?>
 <p:sld xmlns:a="http://schemas.openxmlformats.org/drawingml/2006/main" xmlns:r="http://schemas.openxmlformats.org/officeDocument/2006/relationships" xmlns:p="http://schemas.openxmlformats.org/presentationml/2006/main">
   <p:cSld>
     <p:spTree>
@@ -4173,7 +4343,7 @@
             </a:pPr>
             <a:r>
               <a:rPr lang="en-US" noProof="0" dirty="0"/>
-              <a:t>Lazy evaluation/loading</a:t>
+              <a:t>Degeneracy</a:t>
             </a:r>
           </a:p>
           <a:p>
@@ -4211,8 +4381,15 @@
             </a:pPr>
             <a:r>
               <a:rPr lang="en-US" noProof="0" dirty="0"/>
-              <a:t>Degeneracy</a:t>
-            </a:r>
+              <a:t>Lazy evaluation/loading</a:t>
+            </a:r>
+          </a:p>
+          <a:p>
+            <a:pPr marL="514350" indent="-514350">
+              <a:buFont typeface="+mj-lt"/>
+              <a:buAutoNum type="arabicPeriod"/>
+            </a:pPr>
+            <a:endParaRPr lang="en-US" noProof="0" dirty="0"/>
           </a:p>
           <a:p>
             <a:pPr marL="514350" indent="-514350">
@@ -4405,45 +4582,6 @@
           </a:prstGeom>
         </p:spPr>
       </p:pic>
-      <p:sp>
-        <p:nvSpPr>
-          <p:cNvPr id="6" name="TextBox 5">
-            <a:extLst>
-              <a:ext uri="{FF2B5EF4-FFF2-40B4-BE49-F238E27FC236}">
-                <a16:creationId xmlns:a16="http://schemas.microsoft.com/office/drawing/2014/main" id="{E6724EAC-FED4-CA45-3310-65313A613C49}"/>
-              </a:ext>
-            </a:extLst>
-          </p:cNvPr>
-          <p:cNvSpPr txBox="1"/>
-          <p:nvPr/>
-        </p:nvSpPr>
-        <p:spPr>
-          <a:xfrm>
-            <a:off x="7340329" y="1506022"/>
-            <a:ext cx="4013471" cy="369332"/>
-          </a:xfrm>
-          <a:prstGeom prst="rect">
-            <a:avLst/>
-          </a:prstGeom>
-          <a:noFill/>
-        </p:spPr>
-        <p:txBody>
-          <a:bodyPr wrap="none" rtlCol="0">
-            <a:spAutoFit/>
-          </a:bodyPr>
-          <a:lstStyle/>
-          <a:p>
-            <a:r>
-              <a:rPr lang="en-US" b="1" noProof="0" dirty="0">
-                <a:solidFill>
-                  <a:srgbClr val="FF0000"/>
-                </a:solidFill>
-              </a:rPr>
-              <a:t>FIXME: Add table for operators/types</a:t>
-            </a:r>
-          </a:p>
-        </p:txBody>
-      </p:sp>
     </p:spTree>
     <p:extLst>
       <p:ext uri="{BB962C8B-B14F-4D97-AF65-F5344CB8AC3E}">
@@ -4458,6 +4596,294 @@
 </file>
 
 <file path=ppt/slides/slide4.xml><?xml version="1.0" encoding="utf-8"?>
+<p:sld xmlns:a="http://schemas.openxmlformats.org/drawingml/2006/main" xmlns:r="http://schemas.openxmlformats.org/officeDocument/2006/relationships" xmlns:p="http://schemas.openxmlformats.org/presentationml/2006/main">
+  <p:cSld>
+    <p:spTree>
+      <p:nvGrpSpPr>
+        <p:cNvPr id="1" name="">
+          <a:extLst>
+            <a:ext uri="{FF2B5EF4-FFF2-40B4-BE49-F238E27FC236}">
+              <a16:creationId xmlns:a16="http://schemas.microsoft.com/office/drawing/2014/main" id="{F9E436EB-8D90-2618-CCDC-6487BAD70429}"/>
+            </a:ext>
+          </a:extLst>
+        </p:cNvPr>
+        <p:cNvGrpSpPr/>
+        <p:nvPr/>
+      </p:nvGrpSpPr>
+      <p:grpSpPr>
+        <a:xfrm>
+          <a:off x="0" y="0"/>
+          <a:ext cx="0" cy="0"/>
+          <a:chOff x="0" y="0"/>
+          <a:chExt cx="0" cy="0"/>
+        </a:xfrm>
+      </p:grpSpPr>
+      <p:sp>
+        <p:nvSpPr>
+          <p:cNvPr id="2" name="Title 1">
+            <a:extLst>
+              <a:ext uri="{FF2B5EF4-FFF2-40B4-BE49-F238E27FC236}">
+                <a16:creationId xmlns:a16="http://schemas.microsoft.com/office/drawing/2014/main" id="{A80E83CB-22A8-0ED0-9666-D21F165B1D33}"/>
+              </a:ext>
+            </a:extLst>
+          </p:cNvPr>
+          <p:cNvSpPr>
+            <a:spLocks noGrp="1"/>
+          </p:cNvSpPr>
+          <p:nvPr>
+            <p:ph type="title"/>
+          </p:nvPr>
+        </p:nvSpPr>
+        <p:spPr/>
+        <p:txBody>
+          <a:bodyPr/>
+          <a:lstStyle/>
+          <a:p>
+            <a:r>
+              <a:rPr lang="en-US" noProof="0" dirty="0"/>
+              <a:t>1. Numeric Type Emulation</a:t>
+            </a:r>
+          </a:p>
+        </p:txBody>
+      </p:sp>
+      <p:grpSp>
+        <p:nvGrpSpPr>
+          <p:cNvPr id="11" name="Group 10">
+            <a:extLst>
+              <a:ext uri="{FF2B5EF4-FFF2-40B4-BE49-F238E27FC236}">
+                <a16:creationId xmlns:a16="http://schemas.microsoft.com/office/drawing/2014/main" id="{8CF66623-CE24-406B-437E-DC489FDF428B}"/>
+              </a:ext>
+            </a:extLst>
+          </p:cNvPr>
+          <p:cNvGrpSpPr/>
+          <p:nvPr/>
+        </p:nvGrpSpPr>
+        <p:grpSpPr>
+          <a:xfrm>
+            <a:off x="1911354" y="1864308"/>
+            <a:ext cx="8369291" cy="4802187"/>
+            <a:chOff x="2432129" y="1690688"/>
+            <a:chExt cx="7327740" cy="4204559"/>
+          </a:xfrm>
+        </p:grpSpPr>
+        <p:pic>
+          <p:nvPicPr>
+            <p:cNvPr id="9" name="Picture 8">
+              <a:extLst>
+                <a:ext uri="{FF2B5EF4-FFF2-40B4-BE49-F238E27FC236}">
+                  <a16:creationId xmlns:a16="http://schemas.microsoft.com/office/drawing/2014/main" id="{2AA6F78C-6552-3A17-C0C1-1EBDC7472DC9}"/>
+                </a:ext>
+              </a:extLst>
+            </p:cNvPr>
+            <p:cNvPicPr>
+              <a:picLocks noChangeAspect="1"/>
+            </p:cNvPicPr>
+            <p:nvPr/>
+          </p:nvPicPr>
+          <p:blipFill>
+            <a:blip r:embed="rId2"/>
+            <a:srcRect t="83617"/>
+            <a:stretch>
+              <a:fillRect/>
+            </a:stretch>
+          </p:blipFill>
+          <p:spPr>
+            <a:xfrm>
+              <a:off x="2432130" y="5081286"/>
+              <a:ext cx="7327739" cy="813961"/>
+            </a:xfrm>
+            <a:prstGeom prst="rect">
+              <a:avLst/>
+            </a:prstGeom>
+          </p:spPr>
+        </p:pic>
+        <p:pic>
+          <p:nvPicPr>
+            <p:cNvPr id="10" name="Picture 9">
+              <a:extLst>
+                <a:ext uri="{FF2B5EF4-FFF2-40B4-BE49-F238E27FC236}">
+                  <a16:creationId xmlns:a16="http://schemas.microsoft.com/office/drawing/2014/main" id="{645287F6-87E7-36BF-C33B-3DB930596DA2}"/>
+                </a:ext>
+              </a:extLst>
+            </p:cNvPr>
+            <p:cNvPicPr>
+              <a:picLocks noChangeAspect="1"/>
+            </p:cNvPicPr>
+            <p:nvPr/>
+          </p:nvPicPr>
+          <p:blipFill>
+            <a:blip r:embed="rId2"/>
+            <a:srcRect b="31758"/>
+            <a:stretch>
+              <a:fillRect/>
+            </a:stretch>
+          </p:blipFill>
+          <p:spPr>
+            <a:xfrm>
+              <a:off x="2432129" y="1690688"/>
+              <a:ext cx="7327739" cy="3390598"/>
+            </a:xfrm>
+            <a:prstGeom prst="rect">
+              <a:avLst/>
+            </a:prstGeom>
+          </p:spPr>
+        </p:pic>
+      </p:grpSp>
+      <p:sp>
+        <p:nvSpPr>
+          <p:cNvPr id="14" name="TextBox 13">
+            <a:extLst>
+              <a:ext uri="{FF2B5EF4-FFF2-40B4-BE49-F238E27FC236}">
+                <a16:creationId xmlns:a16="http://schemas.microsoft.com/office/drawing/2014/main" id="{B6FAC8EF-8918-EB41-FEA6-BB3C2A982922}"/>
+              </a:ext>
+            </a:extLst>
+          </p:cNvPr>
+          <p:cNvSpPr txBox="1"/>
+          <p:nvPr/>
+        </p:nvSpPr>
+        <p:spPr>
+          <a:xfrm>
+            <a:off x="2233915" y="1494976"/>
+            <a:ext cx="1179234" cy="369332"/>
+          </a:xfrm>
+          <a:prstGeom prst="rect">
+            <a:avLst/>
+          </a:prstGeom>
+          <a:noFill/>
+        </p:spPr>
+        <p:txBody>
+          <a:bodyPr wrap="none" rtlCol="0">
+            <a:spAutoFit/>
+          </a:bodyPr>
+          <a:lstStyle/>
+          <a:p>
+            <a:r>
+              <a:rPr lang="en-US" noProof="0" dirty="0"/>
+              <a:t>Operation</a:t>
+            </a:r>
+            <a:endParaRPr lang="en-US" dirty="0"/>
+          </a:p>
+        </p:txBody>
+      </p:sp>
+      <p:sp>
+        <p:nvSpPr>
+          <p:cNvPr id="15" name="TextBox 14">
+            <a:extLst>
+              <a:ext uri="{FF2B5EF4-FFF2-40B4-BE49-F238E27FC236}">
+                <a16:creationId xmlns:a16="http://schemas.microsoft.com/office/drawing/2014/main" id="{67646E99-31A4-D25C-EC3B-1B5E9B55C85A}"/>
+              </a:ext>
+            </a:extLst>
+          </p:cNvPr>
+          <p:cNvSpPr txBox="1"/>
+          <p:nvPr/>
+        </p:nvSpPr>
+        <p:spPr>
+          <a:xfrm>
+            <a:off x="4134092" y="1506022"/>
+            <a:ext cx="932243" cy="369332"/>
+          </a:xfrm>
+          <a:prstGeom prst="rect">
+            <a:avLst/>
+          </a:prstGeom>
+          <a:noFill/>
+        </p:spPr>
+        <p:txBody>
+          <a:bodyPr wrap="none" rtlCol="0">
+            <a:spAutoFit/>
+          </a:bodyPr>
+          <a:lstStyle/>
+          <a:p>
+            <a:r>
+              <a:rPr lang="en-US" dirty="0"/>
+              <a:t>Symbol</a:t>
+            </a:r>
+          </a:p>
+        </p:txBody>
+      </p:sp>
+      <p:sp>
+        <p:nvSpPr>
+          <p:cNvPr id="16" name="TextBox 15">
+            <a:extLst>
+              <a:ext uri="{FF2B5EF4-FFF2-40B4-BE49-F238E27FC236}">
+                <a16:creationId xmlns:a16="http://schemas.microsoft.com/office/drawing/2014/main" id="{8B938114-D7AC-3B42-A8DF-84DBDBD676C8}"/>
+              </a:ext>
+            </a:extLst>
+          </p:cNvPr>
+          <p:cNvSpPr txBox="1"/>
+          <p:nvPr/>
+        </p:nvSpPr>
+        <p:spPr>
+          <a:xfrm>
+            <a:off x="6451231" y="1494976"/>
+            <a:ext cx="947695" cy="369332"/>
+          </a:xfrm>
+          <a:prstGeom prst="rect">
+            <a:avLst/>
+          </a:prstGeom>
+          <a:noFill/>
+        </p:spPr>
+        <p:txBody>
+          <a:bodyPr wrap="none" rtlCol="0">
+            <a:spAutoFit/>
+          </a:bodyPr>
+          <a:lstStyle/>
+          <a:p>
+            <a:r>
+              <a:rPr lang="en-US" dirty="0"/>
+              <a:t>Method</a:t>
+            </a:r>
+          </a:p>
+        </p:txBody>
+      </p:sp>
+      <p:sp>
+        <p:nvSpPr>
+          <p:cNvPr id="17" name="TextBox 16">
+            <a:extLst>
+              <a:ext uri="{FF2B5EF4-FFF2-40B4-BE49-F238E27FC236}">
+                <a16:creationId xmlns:a16="http://schemas.microsoft.com/office/drawing/2014/main" id="{CBF70C75-145D-2974-3B75-43F0D7BFF597}"/>
+              </a:ext>
+            </a:extLst>
+          </p:cNvPr>
+          <p:cNvSpPr txBox="1"/>
+          <p:nvPr/>
+        </p:nvSpPr>
+        <p:spPr>
+          <a:xfrm>
+            <a:off x="8792020" y="1494976"/>
+            <a:ext cx="690767" cy="369332"/>
+          </a:xfrm>
+          <a:prstGeom prst="rect">
+            <a:avLst/>
+          </a:prstGeom>
+          <a:noFill/>
+        </p:spPr>
+        <p:txBody>
+          <a:bodyPr wrap="none" rtlCol="0">
+            <a:spAutoFit/>
+          </a:bodyPr>
+          <a:lstStyle/>
+          <a:p>
+            <a:r>
+              <a:rPr lang="en-US" dirty="0"/>
+              <a:t>Math</a:t>
+            </a:r>
+          </a:p>
+        </p:txBody>
+      </p:sp>
+    </p:spTree>
+    <p:extLst>
+      <p:ext uri="{BB962C8B-B14F-4D97-AF65-F5344CB8AC3E}">
+        <p14:creationId xmlns:p14="http://schemas.microsoft.com/office/powerpoint/2010/main" val="2523502255"/>
+      </p:ext>
+    </p:extLst>
+  </p:cSld>
+  <p:clrMapOvr>
+    <a:masterClrMapping/>
+  </p:clrMapOvr>
+</p:sld>
+</file>
+
+<file path=ppt/slides/slide5.xml><?xml version="1.0" encoding="utf-8"?>
 <p:sld xmlns:a="http://schemas.openxmlformats.org/drawingml/2006/main" xmlns:r="http://schemas.openxmlformats.org/officeDocument/2006/relationships" xmlns:p="http://schemas.openxmlformats.org/presentationml/2006/main">
   <p:cSld>
     <p:spTree>
@@ -4577,7 +5003,7 @@
         </p:blipFill>
         <p:spPr>
           <a:xfrm>
-            <a:off x="2566365" y="2753584"/>
+            <a:off x="2053381" y="2753584"/>
             <a:ext cx="2827438" cy="2310224"/>
           </a:xfrm>
           <a:prstGeom prst="rect">
@@ -4667,7 +5093,7 @@
         </p:blipFill>
         <p:spPr bwMode="auto">
           <a:xfrm>
-            <a:off x="6096000" y="2753584"/>
+            <a:off x="5289871" y="2753584"/>
             <a:ext cx="2827438" cy="2310225"/>
           </a:xfrm>
           <a:prstGeom prst="rect">
@@ -4685,6 +5111,36 @@
           </a:extLst>
         </p:spPr>
       </p:pic>
+      <p:pic>
+        <p:nvPicPr>
+          <p:cNvPr id="14" name="Picture 13">
+            <a:extLst>
+              <a:ext uri="{FF2B5EF4-FFF2-40B4-BE49-F238E27FC236}">
+                <a16:creationId xmlns:a16="http://schemas.microsoft.com/office/drawing/2014/main" id="{E9BBBD3B-FC34-AA92-AFD2-3FA80FDEBB98}"/>
+              </a:ext>
+            </a:extLst>
+          </p:cNvPr>
+          <p:cNvPicPr>
+            <a:picLocks noChangeAspect="1"/>
+          </p:cNvPicPr>
+          <p:nvPr/>
+        </p:nvPicPr>
+        <p:blipFill>
+          <a:blip r:embed="rId4"/>
+          <a:stretch>
+            <a:fillRect/>
+          </a:stretch>
+        </p:blipFill>
+        <p:spPr>
+          <a:xfrm>
+            <a:off x="8730888" y="2688164"/>
+            <a:ext cx="2531279" cy="2576346"/>
+          </a:xfrm>
+          <a:prstGeom prst="rect">
+            <a:avLst/>
+          </a:prstGeom>
+        </p:spPr>
+      </p:pic>
     </p:spTree>
     <p:extLst>
       <p:ext uri="{BB962C8B-B14F-4D97-AF65-F5344CB8AC3E}">
@@ -4698,7 +5154,7 @@
 </p:sld>
 </file>
 
-<file path=ppt/slides/slide5.xml><?xml version="1.0" encoding="utf-8"?>
+<file path=ppt/slides/slide6.xml><?xml version="1.0" encoding="utf-8"?>
 <p:sld xmlns:a="http://schemas.openxmlformats.org/drawingml/2006/main" xmlns:r="http://schemas.openxmlformats.org/officeDocument/2006/relationships" xmlns:p="http://schemas.openxmlformats.org/presentationml/2006/main">
   <p:cSld>
     <p:spTree>
@@ -4787,6 +5243,96 @@
           </a:p>
         </p:txBody>
       </p:sp>
+      <p:pic>
+        <p:nvPicPr>
+          <p:cNvPr id="3" name="Picture 2">
+            <a:extLst>
+              <a:ext uri="{FF2B5EF4-FFF2-40B4-BE49-F238E27FC236}">
+                <a16:creationId xmlns:a16="http://schemas.microsoft.com/office/drawing/2014/main" id="{A749086B-A3CD-99FB-32A6-02258A07E357}"/>
+              </a:ext>
+            </a:extLst>
+          </p:cNvPr>
+          <p:cNvPicPr>
+            <a:picLocks noChangeAspect="1"/>
+          </p:cNvPicPr>
+          <p:nvPr/>
+        </p:nvPicPr>
+        <p:blipFill>
+          <a:blip r:embed="rId2"/>
+          <a:stretch>
+            <a:fillRect/>
+          </a:stretch>
+        </p:blipFill>
+        <p:spPr>
+          <a:xfrm>
+            <a:off x="502535" y="3015907"/>
+            <a:ext cx="4045260" cy="830484"/>
+          </a:xfrm>
+          <a:prstGeom prst="rect">
+            <a:avLst/>
+          </a:prstGeom>
+        </p:spPr>
+      </p:pic>
+      <p:pic>
+        <p:nvPicPr>
+          <p:cNvPr id="4" name="Picture 3">
+            <a:extLst>
+              <a:ext uri="{FF2B5EF4-FFF2-40B4-BE49-F238E27FC236}">
+                <a16:creationId xmlns:a16="http://schemas.microsoft.com/office/drawing/2014/main" id="{42DA55B1-59FF-500D-AD9D-546017A659F9}"/>
+              </a:ext>
+            </a:extLst>
+          </p:cNvPr>
+          <p:cNvPicPr>
+            <a:picLocks noChangeAspect="1"/>
+          </p:cNvPicPr>
+          <p:nvPr/>
+        </p:nvPicPr>
+        <p:blipFill>
+          <a:blip r:embed="rId3"/>
+          <a:stretch>
+            <a:fillRect/>
+          </a:stretch>
+        </p:blipFill>
+        <p:spPr>
+          <a:xfrm>
+            <a:off x="1794977" y="4663783"/>
+            <a:ext cx="7586849" cy="737184"/>
+          </a:xfrm>
+          <a:prstGeom prst="rect">
+            <a:avLst/>
+          </a:prstGeom>
+        </p:spPr>
+      </p:pic>
+      <p:pic>
+        <p:nvPicPr>
+          <p:cNvPr id="5" name="Picture 4">
+            <a:extLst>
+              <a:ext uri="{FF2B5EF4-FFF2-40B4-BE49-F238E27FC236}">
+                <a16:creationId xmlns:a16="http://schemas.microsoft.com/office/drawing/2014/main" id="{F9B9DAE0-E0F0-AE49-DDCD-4B2898C581F1}"/>
+              </a:ext>
+            </a:extLst>
+          </p:cNvPr>
+          <p:cNvPicPr>
+            <a:picLocks noChangeAspect="1"/>
+          </p:cNvPicPr>
+          <p:nvPr/>
+        </p:nvPicPr>
+        <p:blipFill>
+          <a:blip r:embed="rId4"/>
+          <a:stretch>
+            <a:fillRect/>
+          </a:stretch>
+        </p:blipFill>
+        <p:spPr>
+          <a:xfrm>
+            <a:off x="5588402" y="2802550"/>
+            <a:ext cx="5082788" cy="1252900"/>
+          </a:xfrm>
+          <a:prstGeom prst="rect">
+            <a:avLst/>
+          </a:prstGeom>
+        </p:spPr>
+      </p:pic>
     </p:spTree>
     <p:extLst>
       <p:ext uri="{BB962C8B-B14F-4D97-AF65-F5344CB8AC3E}">
@@ -4800,7 +5346,7 @@
 </p:sld>
 </file>
 
-<file path=ppt/slides/slide6.xml><?xml version="1.0" encoding="utf-8"?>
+<file path=ppt/slides/slide7.xml><?xml version="1.0" encoding="utf-8"?>
 <p:sld xmlns:a="http://schemas.openxmlformats.org/drawingml/2006/main" xmlns:r="http://schemas.openxmlformats.org/officeDocument/2006/relationships" xmlns:p="http://schemas.openxmlformats.org/presentationml/2006/main">
   <p:cSld>
     <p:spTree>
@@ -4946,7 +5492,7 @@
 </p:sld>
 </file>
 
-<file path=ppt/slides/slide7.xml><?xml version="1.0" encoding="utf-8"?>
+<file path=ppt/slides/slide8.xml><?xml version="1.0" encoding="utf-8"?>
 <p:sld xmlns:a="http://schemas.openxmlformats.org/drawingml/2006/main" xmlns:r="http://schemas.openxmlformats.org/officeDocument/2006/relationships" xmlns:p="http://schemas.openxmlformats.org/presentationml/2006/main">
   <p:cSld>
     <p:spTree>
@@ -4954,7 +5500,7 @@
         <p:cNvPr id="1" name="">
           <a:extLst>
             <a:ext uri="{FF2B5EF4-FFF2-40B4-BE49-F238E27FC236}">
-              <a16:creationId xmlns:a16="http://schemas.microsoft.com/office/drawing/2014/main" id="{5ECC968A-2FF9-EEF0-AD71-4287E96866EF}"/>
+              <a16:creationId xmlns:a16="http://schemas.microsoft.com/office/drawing/2014/main" id="{31E502F0-B295-3CBC-0C07-E4C4618F657C}"/>
             </a:ext>
           </a:extLst>
         </p:cNvPr>
@@ -4974,7 +5520,7 @@
           <p:cNvPr id="2" name="Title 1">
             <a:extLst>
               <a:ext uri="{FF2B5EF4-FFF2-40B4-BE49-F238E27FC236}">
-                <a16:creationId xmlns:a16="http://schemas.microsoft.com/office/drawing/2014/main" id="{3E179F48-7165-7991-F11F-8BC1A9748973}"/>
+                <a16:creationId xmlns:a16="http://schemas.microsoft.com/office/drawing/2014/main" id="{23C5BDF2-9E97-C703-B53F-458CDBB963C7}"/>
               </a:ext>
             </a:extLst>
           </p:cNvPr>
@@ -4992,7 +5538,7 @@
           <a:p>
             <a:r>
               <a:rPr lang="en-US" noProof="0" dirty="0"/>
-              <a:t>4. Lazy evaluation/loading</a:t>
+              <a:t>4. Degeneracy</a:t>
             </a:r>
           </a:p>
         </p:txBody>
@@ -5002,7 +5548,7 @@
           <p:cNvPr id="9" name="Content Placeholder 2">
             <a:extLst>
               <a:ext uri="{FF2B5EF4-FFF2-40B4-BE49-F238E27FC236}">
-                <a16:creationId xmlns:a16="http://schemas.microsoft.com/office/drawing/2014/main" id="{EDA5731D-E44C-09F3-F516-2CA8FBB0E8C1}"/>
+                <a16:creationId xmlns:a16="http://schemas.microsoft.com/office/drawing/2014/main" id="{CFC3F66B-5B1C-5DC6-40A2-60B545495C28}"/>
               </a:ext>
             </a:extLst>
           </p:cNvPr>
@@ -5025,89 +5571,346 @@
           </a:bodyPr>
           <a:lstStyle/>
           <a:p>
-            <a:pPr marL="571500" indent="-571500">
-              <a:buFont typeface="+mj-lt"/>
-              <a:buAutoNum type="romanUcPeriod"/>
+            <a:pPr marL="0" indent="0">
+              <a:buNone/>
             </a:pPr>
             <a:r>
               <a:rPr lang="en-US" noProof="0" dirty="0"/>
-              <a:t>Certain properties (i.e., </a:t>
-            </a:r>
-            <a:r>
-              <a:rPr lang="en-US" noProof="0" dirty="0" err="1"/>
-              <a:t>poly.vol</a:t>
-            </a:r>
-            <a:r>
-              <a:rPr lang="en-US" noProof="0" dirty="0"/>
-              <a:t>) are expensive to calculate. These properties are not calculated at object initialization, but only when the ‘attribute’ is accessed (and then, they are saved to the object).</a:t>
-            </a:r>
-          </a:p>
-          <a:p>
-            <a:pPr lvl="1"/>
-            <a:r>
-              <a:rPr lang="en-US" noProof="0" dirty="0"/>
-              <a:t>Same for H-</a:t>
-            </a:r>
-            <a:r>
-              <a:rPr lang="en-US" noProof="0" dirty="0" err="1"/>
-              <a:t>repr</a:t>
-            </a:r>
-            <a:r>
-              <a:rPr lang="en-US" noProof="0" dirty="0"/>
-              <a:t> and V-</a:t>
-            </a:r>
-            <a:r>
-              <a:rPr lang="en-US" noProof="0" dirty="0" err="1"/>
-              <a:t>repr</a:t>
-            </a:r>
-            <a:r>
-              <a:rPr lang="en-US" noProof="0" dirty="0"/>
-              <a:t> of a polytope.</a:t>
-            </a:r>
-          </a:p>
-          <a:p>
-            <a:pPr marL="571500" indent="-571500">
-              <a:buFont typeface="+mj-lt"/>
-              <a:buAutoNum type="romanUcPeriod"/>
+              <a:t>The package can deal with two types of degeneracy.</a:t>
+            </a:r>
+          </a:p>
+        </p:txBody>
+      </p:sp>
+      <p:sp>
+        <p:nvSpPr>
+          <p:cNvPr id="5" name="TextBox 4">
+            <a:extLst>
+              <a:ext uri="{FF2B5EF4-FFF2-40B4-BE49-F238E27FC236}">
+                <a16:creationId xmlns:a16="http://schemas.microsoft.com/office/drawing/2014/main" id="{427E9B99-D70D-75A2-F074-0FEBC629E012}"/>
+              </a:ext>
+            </a:extLst>
+          </p:cNvPr>
+          <p:cNvSpPr txBox="1"/>
+          <p:nvPr/>
+        </p:nvSpPr>
+        <p:spPr>
+          <a:xfrm>
+            <a:off x="3127432" y="5764044"/>
+            <a:ext cx="5937135" cy="646331"/>
+          </a:xfrm>
+          <a:prstGeom prst="rect">
+            <a:avLst/>
+          </a:prstGeom>
+          <a:solidFill>
+            <a:srgbClr val="EC7246"/>
+          </a:solidFill>
+          <a:ln>
+            <a:noFill/>
+          </a:ln>
+        </p:spPr>
+        <p:txBody>
+          <a:bodyPr wrap="square" rtlCol="0">
+            <a:spAutoFit/>
+          </a:bodyPr>
+          <a:lstStyle/>
+          <a:p>
+            <a:pPr algn="ctr"/>
+            <a:r>
+              <a:rPr lang="en-US" b="1" noProof="0" dirty="0">
+                <a:solidFill>
+                  <a:srgbClr val="FFFFFF"/>
+                </a:solidFill>
+              </a:rPr>
+              <a:t>Challenge: </a:t>
+            </a:r>
+            <a:r>
+              <a:rPr lang="en-US" noProof="0" dirty="0">
+                <a:solidFill>
+                  <a:srgbClr val="FFFFFF"/>
+                </a:solidFill>
+              </a:rPr>
+              <a:t>There are an increasing number of edge-cases to consider when dealing with degeneracy</a:t>
+            </a:r>
+          </a:p>
+        </p:txBody>
+      </p:sp>
+      <p:sp>
+        <p:nvSpPr>
+          <p:cNvPr id="7" name="Content Placeholder 2">
+            <a:extLst>
+              <a:ext uri="{FF2B5EF4-FFF2-40B4-BE49-F238E27FC236}">
+                <a16:creationId xmlns:a16="http://schemas.microsoft.com/office/drawing/2014/main" id="{61CF6B96-25D7-4892-D46D-18C18B965577}"/>
+              </a:ext>
+            </a:extLst>
+          </p:cNvPr>
+          <p:cNvSpPr txBox="1">
+            <a:spLocks/>
+          </p:cNvSpPr>
+          <p:nvPr/>
+        </p:nvSpPr>
+        <p:spPr>
+          <a:xfrm>
+            <a:off x="838199" y="1825625"/>
+            <a:ext cx="10515600" cy="4351338"/>
+          </a:xfrm>
+          <a:prstGeom prst="rect">
+            <a:avLst/>
+          </a:prstGeom>
+        </p:spPr>
+        <p:txBody>
+          <a:bodyPr vert="horz" lIns="91440" tIns="45720" rIns="91440" bIns="45720" numCol="2" rtlCol="0">
+            <a:normAutofit/>
+          </a:bodyPr>
+          <a:lstStyle>
+            <a:lvl1pPr marL="228600" indent="-228600" algn="l" defTabSz="914400" rtl="0" eaLnBrk="1" latinLnBrk="0" hangingPunct="1">
+              <a:lnSpc>
+                <a:spcPct val="90000"/>
+              </a:lnSpc>
+              <a:spcBef>
+                <a:spcPts val="1000"/>
+              </a:spcBef>
+              <a:buFont typeface="Arial" panose="020B0604020202020204" pitchFamily="34" charset="0"/>
+              <a:buChar char="•"/>
+              <a:defRPr sz="2800" kern="1200">
+                <a:solidFill>
+                  <a:schemeClr val="tx1"/>
+                </a:solidFill>
+                <a:latin typeface="+mn-lt"/>
+                <a:ea typeface="+mn-ea"/>
+                <a:cs typeface="+mn-cs"/>
+              </a:defRPr>
+            </a:lvl1pPr>
+            <a:lvl2pPr marL="685800" indent="-228600" algn="l" defTabSz="914400" rtl="0" eaLnBrk="1" latinLnBrk="0" hangingPunct="1">
+              <a:lnSpc>
+                <a:spcPct val="90000"/>
+              </a:lnSpc>
+              <a:spcBef>
+                <a:spcPts val="500"/>
+              </a:spcBef>
+              <a:buFont typeface="Arial" panose="020B0604020202020204" pitchFamily="34" charset="0"/>
+              <a:buChar char="•"/>
+              <a:defRPr sz="2400" kern="1200">
+                <a:solidFill>
+                  <a:schemeClr val="tx1"/>
+                </a:solidFill>
+                <a:latin typeface="+mn-lt"/>
+                <a:ea typeface="+mn-ea"/>
+                <a:cs typeface="+mn-cs"/>
+              </a:defRPr>
+            </a:lvl2pPr>
+            <a:lvl3pPr marL="1143000" indent="-228600" algn="l" defTabSz="914400" rtl="0" eaLnBrk="1" latinLnBrk="0" hangingPunct="1">
+              <a:lnSpc>
+                <a:spcPct val="90000"/>
+              </a:lnSpc>
+              <a:spcBef>
+                <a:spcPts val="500"/>
+              </a:spcBef>
+              <a:buFont typeface="Arial" panose="020B0604020202020204" pitchFamily="34" charset="0"/>
+              <a:buChar char="•"/>
+              <a:defRPr sz="2000" kern="1200">
+                <a:solidFill>
+                  <a:schemeClr val="tx1"/>
+                </a:solidFill>
+                <a:latin typeface="+mn-lt"/>
+                <a:ea typeface="+mn-ea"/>
+                <a:cs typeface="+mn-cs"/>
+              </a:defRPr>
+            </a:lvl3pPr>
+            <a:lvl4pPr marL="1600200" indent="-228600" algn="l" defTabSz="914400" rtl="0" eaLnBrk="1" latinLnBrk="0" hangingPunct="1">
+              <a:lnSpc>
+                <a:spcPct val="90000"/>
+              </a:lnSpc>
+              <a:spcBef>
+                <a:spcPts val="500"/>
+              </a:spcBef>
+              <a:buFont typeface="Arial" panose="020B0604020202020204" pitchFamily="34" charset="0"/>
+              <a:buChar char="•"/>
+              <a:defRPr sz="1800" kern="1200">
+                <a:solidFill>
+                  <a:schemeClr val="tx1"/>
+                </a:solidFill>
+                <a:latin typeface="+mn-lt"/>
+                <a:ea typeface="+mn-ea"/>
+                <a:cs typeface="+mn-cs"/>
+              </a:defRPr>
+            </a:lvl4pPr>
+            <a:lvl5pPr marL="2057400" indent="-228600" algn="l" defTabSz="914400" rtl="0" eaLnBrk="1" latinLnBrk="0" hangingPunct="1">
+              <a:lnSpc>
+                <a:spcPct val="90000"/>
+              </a:lnSpc>
+              <a:spcBef>
+                <a:spcPts val="500"/>
+              </a:spcBef>
+              <a:buFont typeface="Arial" panose="020B0604020202020204" pitchFamily="34" charset="0"/>
+              <a:buChar char="•"/>
+              <a:defRPr sz="1800" kern="1200">
+                <a:solidFill>
+                  <a:schemeClr val="tx1"/>
+                </a:solidFill>
+                <a:latin typeface="+mn-lt"/>
+                <a:ea typeface="+mn-ea"/>
+                <a:cs typeface="+mn-cs"/>
+              </a:defRPr>
+            </a:lvl5pPr>
+            <a:lvl6pPr marL="2514600" indent="-228600" algn="l" defTabSz="914400" rtl="0" eaLnBrk="1" latinLnBrk="0" hangingPunct="1">
+              <a:lnSpc>
+                <a:spcPct val="90000"/>
+              </a:lnSpc>
+              <a:spcBef>
+                <a:spcPts val="500"/>
+              </a:spcBef>
+              <a:buFont typeface="Arial" panose="020B0604020202020204" pitchFamily="34" charset="0"/>
+              <a:buChar char="•"/>
+              <a:defRPr sz="1800" kern="1200">
+                <a:solidFill>
+                  <a:schemeClr val="tx1"/>
+                </a:solidFill>
+                <a:latin typeface="+mn-lt"/>
+                <a:ea typeface="+mn-ea"/>
+                <a:cs typeface="+mn-cs"/>
+              </a:defRPr>
+            </a:lvl6pPr>
+            <a:lvl7pPr marL="2971800" indent="-228600" algn="l" defTabSz="914400" rtl="0" eaLnBrk="1" latinLnBrk="0" hangingPunct="1">
+              <a:lnSpc>
+                <a:spcPct val="90000"/>
+              </a:lnSpc>
+              <a:spcBef>
+                <a:spcPts val="500"/>
+              </a:spcBef>
+              <a:buFont typeface="Arial" panose="020B0604020202020204" pitchFamily="34" charset="0"/>
+              <a:buChar char="•"/>
+              <a:defRPr sz="1800" kern="1200">
+                <a:solidFill>
+                  <a:schemeClr val="tx1"/>
+                </a:solidFill>
+                <a:latin typeface="+mn-lt"/>
+                <a:ea typeface="+mn-ea"/>
+                <a:cs typeface="+mn-cs"/>
+              </a:defRPr>
+            </a:lvl7pPr>
+            <a:lvl8pPr marL="3429000" indent="-228600" algn="l" defTabSz="914400" rtl="0" eaLnBrk="1" latinLnBrk="0" hangingPunct="1">
+              <a:lnSpc>
+                <a:spcPct val="90000"/>
+              </a:lnSpc>
+              <a:spcBef>
+                <a:spcPts val="500"/>
+              </a:spcBef>
+              <a:buFont typeface="Arial" panose="020B0604020202020204" pitchFamily="34" charset="0"/>
+              <a:buChar char="•"/>
+              <a:defRPr sz="1800" kern="1200">
+                <a:solidFill>
+                  <a:schemeClr val="tx1"/>
+                </a:solidFill>
+                <a:latin typeface="+mn-lt"/>
+                <a:ea typeface="+mn-ea"/>
+                <a:cs typeface="+mn-cs"/>
+              </a:defRPr>
+            </a:lvl8pPr>
+            <a:lvl9pPr marL="3886200" indent="-228600" algn="l" defTabSz="914400" rtl="0" eaLnBrk="1" latinLnBrk="0" hangingPunct="1">
+              <a:lnSpc>
+                <a:spcPct val="90000"/>
+              </a:lnSpc>
+              <a:spcBef>
+                <a:spcPts val="500"/>
+              </a:spcBef>
+              <a:buFont typeface="Arial" panose="020B0604020202020204" pitchFamily="34" charset="0"/>
+              <a:buChar char="•"/>
+              <a:defRPr sz="1800" kern="1200">
+                <a:solidFill>
+                  <a:schemeClr val="tx1"/>
+                </a:solidFill>
+                <a:latin typeface="+mn-lt"/>
+                <a:ea typeface="+mn-ea"/>
+                <a:cs typeface="+mn-cs"/>
+              </a:defRPr>
+            </a:lvl9pPr>
+          </a:lstStyle>
+          <a:p>
+            <a:pPr marL="0" indent="0">
+              <a:buFont typeface="Arial" panose="020B0604020202020204" pitchFamily="34" charset="0"/>
+              <a:buNone/>
             </a:pPr>
             <a:r>
-              <a:rPr lang="en-US" noProof="0" dirty="0"/>
-              <a:t>Certain packages (e.g., matplotlib/</a:t>
-            </a:r>
-            <a:r>
-              <a:rPr lang="en-US" noProof="0" dirty="0" err="1"/>
-              <a:t>cvxpy</a:t>
-            </a:r>
-            <a:r>
-              <a:rPr lang="en-US" noProof="0" dirty="0"/>
-              <a:t>) are optional dependencies. These are only imported when called.</a:t>
-            </a:r>
-          </a:p>
-          <a:p>
-            <a:pPr lvl="1"/>
-            <a:r>
-              <a:rPr lang="en-US" noProof="0" dirty="0"/>
-              <a:t>Might create a marginal speed-up.</a:t>
-            </a:r>
-          </a:p>
-          <a:p>
-            <a:pPr lvl="1"/>
-            <a:r>
-              <a:rPr lang="en-US" noProof="0" dirty="0"/>
-              <a:t>The least possible amount of dependencies -&gt; improves longevity.</a:t>
-            </a:r>
-          </a:p>
-          <a:p>
-            <a:endParaRPr lang="en-US" noProof="0" dirty="0"/>
+              <a:rPr lang="en-US" dirty="0"/>
+              <a:t> </a:t>
+            </a:r>
+          </a:p>
+          <a:p>
+            <a:r>
+              <a:rPr lang="en-US" dirty="0"/>
+              <a:t>Type-0 degeneracy </a:t>
+            </a:r>
+          </a:p>
+          <a:p>
+            <a:pPr marL="0" indent="0">
+              <a:buNone/>
+            </a:pPr>
+            <a:r>
+              <a:rPr lang="en-US" dirty="0"/>
+              <a:t>(no volume, ‘flat’)</a:t>
+            </a:r>
+          </a:p>
+          <a:p>
+            <a:endParaRPr lang="en-US" dirty="0"/>
+          </a:p>
+          <a:p>
+            <a:pPr marL="0" indent="0">
+              <a:buFont typeface="Arial" panose="020B0604020202020204" pitchFamily="34" charset="0"/>
+              <a:buNone/>
+            </a:pPr>
+            <a:endParaRPr lang="en-US" dirty="0"/>
+          </a:p>
+          <a:p>
+            <a:pPr marL="0" indent="0">
+              <a:buFont typeface="Arial" panose="020B0604020202020204" pitchFamily="34" charset="0"/>
+              <a:buNone/>
+            </a:pPr>
+            <a:endParaRPr lang="en-US" dirty="0"/>
+          </a:p>
+          <a:p>
+            <a:pPr marL="0" indent="0">
+              <a:buFont typeface="Arial" panose="020B0604020202020204" pitchFamily="34" charset="0"/>
+              <a:buNone/>
+            </a:pPr>
+            <a:endParaRPr lang="en-US" dirty="0"/>
+          </a:p>
+          <a:p>
+            <a:pPr marL="0" indent="0">
+              <a:buFont typeface="Arial" panose="020B0604020202020204" pitchFamily="34" charset="0"/>
+              <a:buNone/>
+            </a:pPr>
+            <a:endParaRPr lang="en-US" dirty="0"/>
+          </a:p>
+          <a:p>
+            <a:pPr marL="0" indent="0">
+              <a:buFont typeface="Arial" panose="020B0604020202020204" pitchFamily="34" charset="0"/>
+              <a:buNone/>
+            </a:pPr>
+            <a:endParaRPr lang="en-US" dirty="0"/>
+          </a:p>
+          <a:p>
+            <a:r>
+              <a:rPr lang="en-US" dirty="0"/>
+              <a:t>Type-∞ degeneracy </a:t>
+            </a:r>
+          </a:p>
+          <a:p>
+            <a:pPr marL="0" indent="0">
+              <a:buNone/>
+            </a:pPr>
+            <a:r>
+              <a:rPr lang="en-US" dirty="0"/>
+              <a:t>(infinite volume, ‘unbounded’)</a:t>
+            </a:r>
           </a:p>
         </p:txBody>
       </p:sp>
       <p:pic>
         <p:nvPicPr>
-          <p:cNvPr id="3" name="Picture 2">
-            <a:extLst>
-              <a:ext uri="{FF2B5EF4-FFF2-40B4-BE49-F238E27FC236}">
-                <a16:creationId xmlns:a16="http://schemas.microsoft.com/office/drawing/2014/main" id="{82009382-CC2F-76DB-A9A7-2CD6A9F9E101}"/>
+          <p:cNvPr id="10" name="Picture 9" descr="A graph on a piece of paper&#10;&#10;AI-generated content may be incorrect.">
+            <a:extLst>
+              <a:ext uri="{FF2B5EF4-FFF2-40B4-BE49-F238E27FC236}">
+                <a16:creationId xmlns:a16="http://schemas.microsoft.com/office/drawing/2014/main" id="{0CE8FCA6-3C82-445A-1A72-4E866C6438A3}"/>
               </a:ext>
             </a:extLst>
           </p:cNvPr>
@@ -5124,8 +5927,38 @@
         </p:blipFill>
         <p:spPr>
           <a:xfrm>
-            <a:off x="2425700" y="5707063"/>
-            <a:ext cx="7340600" cy="939800"/>
+            <a:off x="6929375" y="3397774"/>
+            <a:ext cx="3858229" cy="2231333"/>
+          </a:xfrm>
+          <a:prstGeom prst="rect">
+            <a:avLst/>
+          </a:prstGeom>
+        </p:spPr>
+      </p:pic>
+      <p:pic>
+        <p:nvPicPr>
+          <p:cNvPr id="12" name="Picture 11" descr="A graph on a piece of paper&#10;&#10;AI-generated content may be incorrect.">
+            <a:extLst>
+              <a:ext uri="{FF2B5EF4-FFF2-40B4-BE49-F238E27FC236}">
+                <a16:creationId xmlns:a16="http://schemas.microsoft.com/office/drawing/2014/main" id="{24CCA0F4-24C1-AEF7-B042-FEC1B61B923F}"/>
+              </a:ext>
+            </a:extLst>
+          </p:cNvPr>
+          <p:cNvPicPr>
+            <a:picLocks noChangeAspect="1"/>
+          </p:cNvPicPr>
+          <p:nvPr/>
+        </p:nvPicPr>
+        <p:blipFill>
+          <a:blip r:embed="rId3"/>
+          <a:stretch>
+            <a:fillRect/>
+          </a:stretch>
+        </p:blipFill>
+        <p:spPr>
+          <a:xfrm>
+            <a:off x="1602126" y="3325618"/>
+            <a:ext cx="2599483" cy="2370957"/>
           </a:xfrm>
           <a:prstGeom prst="rect">
             <a:avLst/>
@@ -5135,7 +5968,7 @@
     </p:spTree>
     <p:extLst>
       <p:ext uri="{BB962C8B-B14F-4D97-AF65-F5344CB8AC3E}">
-        <p14:creationId xmlns:p14="http://schemas.microsoft.com/office/powerpoint/2010/main" val="2565428227"/>
+        <p14:creationId xmlns:p14="http://schemas.microsoft.com/office/powerpoint/2010/main" val="290186477"/>
       </p:ext>
     </p:extLst>
   </p:cSld>
@@ -5145,7 +5978,7 @@
 </p:sld>
 </file>
 
-<file path=ppt/slides/slide8.xml><?xml version="1.0" encoding="utf-8"?>
+<file path=ppt/slides/slide9.xml><?xml version="1.0" encoding="utf-8"?>
 <p:sld xmlns:a="http://schemas.openxmlformats.org/drawingml/2006/main" xmlns:r="http://schemas.openxmlformats.org/officeDocument/2006/relationships" xmlns:p="http://schemas.openxmlformats.org/presentationml/2006/main">
   <p:cSld>
     <p:spTree>
@@ -5268,148 +6101,6 @@
     <p:extLst>
       <p:ext uri="{BB962C8B-B14F-4D97-AF65-F5344CB8AC3E}">
         <p14:creationId xmlns:p14="http://schemas.microsoft.com/office/powerpoint/2010/main" val="3686185399"/>
-      </p:ext>
-    </p:extLst>
-  </p:cSld>
-  <p:clrMapOvr>
-    <a:masterClrMapping/>
-  </p:clrMapOvr>
-</p:sld>
-</file>
-
-<file path=ppt/slides/slide9.xml><?xml version="1.0" encoding="utf-8"?>
-<p:sld xmlns:a="http://schemas.openxmlformats.org/drawingml/2006/main" xmlns:r="http://schemas.openxmlformats.org/officeDocument/2006/relationships" xmlns:p="http://schemas.openxmlformats.org/presentationml/2006/main">
-  <p:cSld>
-    <p:spTree>
-      <p:nvGrpSpPr>
-        <p:cNvPr id="1" name="">
-          <a:extLst>
-            <a:ext uri="{FF2B5EF4-FFF2-40B4-BE49-F238E27FC236}">
-              <a16:creationId xmlns:a16="http://schemas.microsoft.com/office/drawing/2014/main" id="{644443AF-D87D-72C4-C0B5-43B921A837C5}"/>
-            </a:ext>
-          </a:extLst>
-        </p:cNvPr>
-        <p:cNvGrpSpPr/>
-        <p:nvPr/>
-      </p:nvGrpSpPr>
-      <p:grpSpPr>
-        <a:xfrm>
-          <a:off x="0" y="0"/>
-          <a:ext cx="0" cy="0"/>
-          <a:chOff x="0" y="0"/>
-          <a:chExt cx="0" cy="0"/>
-        </a:xfrm>
-      </p:grpSpPr>
-      <p:sp>
-        <p:nvSpPr>
-          <p:cNvPr id="2" name="Title 1">
-            <a:extLst>
-              <a:ext uri="{FF2B5EF4-FFF2-40B4-BE49-F238E27FC236}">
-                <a16:creationId xmlns:a16="http://schemas.microsoft.com/office/drawing/2014/main" id="{A71E7113-CCF9-8A13-4E22-BF2A99CFA936}"/>
-              </a:ext>
-            </a:extLst>
-          </p:cNvPr>
-          <p:cNvSpPr>
-            <a:spLocks noGrp="1"/>
-          </p:cNvSpPr>
-          <p:nvPr>
-            <p:ph type="title"/>
-          </p:nvPr>
-        </p:nvSpPr>
-        <p:spPr/>
-        <p:txBody>
-          <a:bodyPr/>
-          <a:lstStyle/>
-          <a:p>
-            <a:r>
-              <a:rPr lang="en-US" noProof="0" dirty="0"/>
-              <a:t>6. External libraries integration</a:t>
-            </a:r>
-          </a:p>
-        </p:txBody>
-      </p:sp>
-      <p:sp>
-        <p:nvSpPr>
-          <p:cNvPr id="9" name="Content Placeholder 2">
-            <a:extLst>
-              <a:ext uri="{FF2B5EF4-FFF2-40B4-BE49-F238E27FC236}">
-                <a16:creationId xmlns:a16="http://schemas.microsoft.com/office/drawing/2014/main" id="{0D51A29D-AE98-D7FA-EE99-8D99F651549E}"/>
-              </a:ext>
-            </a:extLst>
-          </p:cNvPr>
-          <p:cNvSpPr>
-            <a:spLocks noGrp="1"/>
-          </p:cNvSpPr>
-          <p:nvPr>
-            <p:ph idx="1"/>
-          </p:nvPr>
-        </p:nvSpPr>
-        <p:spPr>
-          <a:xfrm>
-            <a:off x="838200" y="1825625"/>
-            <a:ext cx="10515600" cy="4351338"/>
-          </a:xfrm>
-        </p:spPr>
-        <p:txBody>
-          <a:bodyPr>
-            <a:normAutofit/>
-          </a:bodyPr>
-          <a:lstStyle/>
-          <a:p>
-            <a:pPr marL="0" indent="0">
-              <a:buNone/>
-            </a:pPr>
-            <a:r>
-              <a:rPr lang="en-US" noProof="0" dirty="0"/>
-              <a:t>The toolbox has special integration features with external libraries.</a:t>
-            </a:r>
-          </a:p>
-          <a:p>
-            <a:r>
-              <a:rPr lang="en-US" noProof="0" dirty="0" err="1"/>
-              <a:t>cvxpy</a:t>
-            </a:r>
-            <a:r>
-              <a:rPr lang="en-US" noProof="0" dirty="0"/>
-              <a:t>: used for internal optimization and external convex optimization problems formulation.</a:t>
-            </a:r>
-          </a:p>
-        </p:txBody>
-      </p:sp>
-      <p:pic>
-        <p:nvPicPr>
-          <p:cNvPr id="3" name="Picture 2">
-            <a:extLst>
-              <a:ext uri="{FF2B5EF4-FFF2-40B4-BE49-F238E27FC236}">
-                <a16:creationId xmlns:a16="http://schemas.microsoft.com/office/drawing/2014/main" id="{A1640261-66E3-4718-6FCF-FF62042E2B70}"/>
-              </a:ext>
-            </a:extLst>
-          </p:cNvPr>
-          <p:cNvPicPr>
-            <a:picLocks noChangeAspect="1"/>
-          </p:cNvPicPr>
-          <p:nvPr/>
-        </p:nvPicPr>
-        <p:blipFill>
-          <a:blip r:embed="rId2"/>
-          <a:stretch>
-            <a:fillRect/>
-          </a:stretch>
-        </p:blipFill>
-        <p:spPr>
-          <a:xfrm>
-            <a:off x="1755011" y="3325098"/>
-            <a:ext cx="8681977" cy="832904"/>
-          </a:xfrm>
-          <a:prstGeom prst="rect">
-            <a:avLst/>
-          </a:prstGeom>
-        </p:spPr>
-      </p:pic>
-    </p:spTree>
-    <p:extLst>
-      <p:ext uri="{BB962C8B-B14F-4D97-AF65-F5344CB8AC3E}">
-        <p14:creationId xmlns:p14="http://schemas.microsoft.com/office/powerpoint/2010/main" val="3078444715"/>
       </p:ext>
     </p:extLst>
   </p:cSld>

</xml_diff>

<commit_message>
Removed the `self.set_aspect('equal', adjustable='box')`, which makes it such that the axes now rescale; perfect! Added comment about Voronoi diagrams and Delaunay triangulations
</commit_message>
<xml_diff>
--- a/presentation.pptx
+++ b/presentation.pptx
@@ -117,6 +117,11 @@
       </a:defRPr>
     </a:lvl9pPr>
   </p:defaultTextStyle>
+  <p:extLst>
+    <p:ext uri="{EFAFB233-063F-42B5-8137-9DF3F51BA10A}">
+      <p15:sldGuideLst xmlns:p15="http://schemas.microsoft.com/office/powerpoint/2012/main"/>
+    </p:ext>
+  </p:extLst>
 </p:presentation>
 </file>
 
@@ -126,6 +131,58 @@
     <p1510:client id="{92BFB444-7DBC-CA44-A6DD-A4B3F7DBDADB}" v="88" dt="2026-01-02T14:56:51.510"/>
   </p1510:revLst>
 </p1510:revInfo>
+</file>
+
+<file path=ppt/changesInfos/changesInfo1.xml><?xml version="1.0" encoding="utf-8"?>
+<pc:chgInfo xmlns:a="http://schemas.openxmlformats.org/drawingml/2006/main" xmlns:r="http://schemas.openxmlformats.org/officeDocument/2006/relationships" xmlns:ac="http://schemas.microsoft.com/office/drawing/2013/main/command" xmlns:pc="http://schemas.microsoft.com/office/powerpoint/2013/main/command">
+  <pc:docChgLst>
+    <pc:chgData name="Bart Wolleswinkel" userId="b168cadc-1825-41ce-b9cc-7c7f06f6f31d" providerId="ADAL" clId="{22248CC1-9068-5BCB-B15B-4353FE48F57D}"/>
+    <pc:docChg chg="custSel modSld">
+      <pc:chgData name="Bart Wolleswinkel" userId="b168cadc-1825-41ce-b9cc-7c7f06f6f31d" providerId="ADAL" clId="{22248CC1-9068-5BCB-B15B-4353FE48F57D}" dt="2026-01-08T13:29:15.403" v="11" actId="5793"/>
+      <pc:docMkLst>
+        <pc:docMk/>
+      </pc:docMkLst>
+      <pc:sldChg chg="modSp mod">
+        <pc:chgData name="Bart Wolleswinkel" userId="b168cadc-1825-41ce-b9cc-7c7f06f6f31d" providerId="ADAL" clId="{22248CC1-9068-5BCB-B15B-4353FE48F57D}" dt="2026-01-08T12:43:12.113" v="3" actId="5793"/>
+        <pc:sldMkLst>
+          <pc:docMk/>
+          <pc:sldMk cId="2563034518" sldId="256"/>
+        </pc:sldMkLst>
+        <pc:spChg chg="mod">
+          <ac:chgData name="Bart Wolleswinkel" userId="b168cadc-1825-41ce-b9cc-7c7f06f6f31d" providerId="ADAL" clId="{22248CC1-9068-5BCB-B15B-4353FE48F57D}" dt="2026-01-08T12:43:12.113" v="3" actId="5793"/>
+          <ac:spMkLst>
+            <pc:docMk/>
+            <pc:sldMk cId="2563034518" sldId="256"/>
+            <ac:spMk id="2" creationId="{11592D63-90DE-8FC5-4122-5EC6AA7A9F3D}"/>
+          </ac:spMkLst>
+        </pc:spChg>
+      </pc:sldChg>
+      <pc:sldChg chg="modSp mod">
+        <pc:chgData name="Bart Wolleswinkel" userId="b168cadc-1825-41ce-b9cc-7c7f06f6f31d" providerId="ADAL" clId="{22248CC1-9068-5BCB-B15B-4353FE48F57D}" dt="2026-01-08T13:29:15.403" v="11" actId="5793"/>
+        <pc:sldMkLst>
+          <pc:docMk/>
+          <pc:sldMk cId="74253125" sldId="267"/>
+        </pc:sldMkLst>
+        <pc:spChg chg="mod">
+          <ac:chgData name="Bart Wolleswinkel" userId="b168cadc-1825-41ce-b9cc-7c7f06f6f31d" providerId="ADAL" clId="{22248CC1-9068-5BCB-B15B-4353FE48F57D}" dt="2026-01-08T13:28:12.162" v="7" actId="20577"/>
+          <ac:spMkLst>
+            <pc:docMk/>
+            <pc:sldMk cId="74253125" sldId="267"/>
+            <ac:spMk id="2" creationId="{41AAC7F8-4717-800F-1167-E97B7F5FBEBE}"/>
+          </ac:spMkLst>
+        </pc:spChg>
+        <pc:spChg chg="mod">
+          <ac:chgData name="Bart Wolleswinkel" userId="b168cadc-1825-41ce-b9cc-7c7f06f6f31d" providerId="ADAL" clId="{22248CC1-9068-5BCB-B15B-4353FE48F57D}" dt="2026-01-08T13:29:15.403" v="11" actId="5793"/>
+          <ac:spMkLst>
+            <pc:docMk/>
+            <pc:sldMk cId="74253125" sldId="267"/>
+            <ac:spMk id="9" creationId="{A8F04E1F-D9F7-6017-DA7A-5C0C6EBEDBF5}"/>
+          </ac:spMkLst>
+        </pc:spChg>
+      </pc:sldChg>
+    </pc:docChg>
+  </pc:docChgLst>
+</pc:chgInfo>
 </file>
 
 <file path=ppt/slideLayouts/slideLayout1.xml><?xml version="1.0" encoding="utf-8"?>
@@ -277,7 +334,7 @@
           <a:p>
             <a:fld id="{FB8718F5-1E4A-7D42-8173-5979EE6FBC1A}" type="datetimeFigureOut">
               <a:rPr lang="en-US" smtClean="0"/>
-              <a:t>12/26/25</a:t>
+              <a:t>1/8/26</a:t>
             </a:fld>
             <a:endParaRPr lang="en-US"/>
           </a:p>
@@ -477,7 +534,7 @@
           <a:p>
             <a:fld id="{FB8718F5-1E4A-7D42-8173-5979EE6FBC1A}" type="datetimeFigureOut">
               <a:rPr lang="en-US" smtClean="0"/>
-              <a:t>12/26/25</a:t>
+              <a:t>1/8/26</a:t>
             </a:fld>
             <a:endParaRPr lang="en-US"/>
           </a:p>
@@ -687,7 +744,7 @@
           <a:p>
             <a:fld id="{FB8718F5-1E4A-7D42-8173-5979EE6FBC1A}" type="datetimeFigureOut">
               <a:rPr lang="en-US" smtClean="0"/>
-              <a:t>12/26/25</a:t>
+              <a:t>1/8/26</a:t>
             </a:fld>
             <a:endParaRPr lang="en-US"/>
           </a:p>
@@ -887,7 +944,7 @@
           <a:p>
             <a:fld id="{FB8718F5-1E4A-7D42-8173-5979EE6FBC1A}" type="datetimeFigureOut">
               <a:rPr lang="en-US" smtClean="0"/>
-              <a:t>12/26/25</a:t>
+              <a:t>1/8/26</a:t>
             </a:fld>
             <a:endParaRPr lang="en-US"/>
           </a:p>
@@ -1163,7 +1220,7 @@
           <a:p>
             <a:fld id="{FB8718F5-1E4A-7D42-8173-5979EE6FBC1A}" type="datetimeFigureOut">
               <a:rPr lang="en-US" smtClean="0"/>
-              <a:t>12/26/25</a:t>
+              <a:t>1/8/26</a:t>
             </a:fld>
             <a:endParaRPr lang="en-US"/>
           </a:p>
@@ -1431,7 +1488,7 @@
           <a:p>
             <a:fld id="{FB8718F5-1E4A-7D42-8173-5979EE6FBC1A}" type="datetimeFigureOut">
               <a:rPr lang="en-US" smtClean="0"/>
-              <a:t>12/26/25</a:t>
+              <a:t>1/8/26</a:t>
             </a:fld>
             <a:endParaRPr lang="en-US"/>
           </a:p>
@@ -1846,7 +1903,7 @@
           <a:p>
             <a:fld id="{FB8718F5-1E4A-7D42-8173-5979EE6FBC1A}" type="datetimeFigureOut">
               <a:rPr lang="en-US" smtClean="0"/>
-              <a:t>12/26/25</a:t>
+              <a:t>1/8/26</a:t>
             </a:fld>
             <a:endParaRPr lang="en-US"/>
           </a:p>
@@ -1988,7 +2045,7 @@
           <a:p>
             <a:fld id="{FB8718F5-1E4A-7D42-8173-5979EE6FBC1A}" type="datetimeFigureOut">
               <a:rPr lang="en-US" smtClean="0"/>
-              <a:t>12/26/25</a:t>
+              <a:t>1/8/26</a:t>
             </a:fld>
             <a:endParaRPr lang="en-US"/>
           </a:p>
@@ -2101,7 +2158,7 @@
           <a:p>
             <a:fld id="{FB8718F5-1E4A-7D42-8173-5979EE6FBC1A}" type="datetimeFigureOut">
               <a:rPr lang="en-US" smtClean="0"/>
-              <a:t>12/26/25</a:t>
+              <a:t>1/8/26</a:t>
             </a:fld>
             <a:endParaRPr lang="en-US"/>
           </a:p>
@@ -2414,7 +2471,7 @@
           <a:p>
             <a:fld id="{FB8718F5-1E4A-7D42-8173-5979EE6FBC1A}" type="datetimeFigureOut">
               <a:rPr lang="en-US" smtClean="0"/>
-              <a:t>12/26/25</a:t>
+              <a:t>1/8/26</a:t>
             </a:fld>
             <a:endParaRPr lang="en-US"/>
           </a:p>
@@ -2703,7 +2760,7 @@
           <a:p>
             <a:fld id="{FB8718F5-1E4A-7D42-8173-5979EE6FBC1A}" type="datetimeFigureOut">
               <a:rPr lang="en-US" smtClean="0"/>
-              <a:t>12/26/25</a:t>
+              <a:t>1/8/26</a:t>
             </a:fld>
             <a:endParaRPr lang="en-US"/>
           </a:p>
@@ -2946,7 +3003,7 @@
           <a:p>
             <a:fld id="{FB8718F5-1E4A-7D42-8173-5979EE6FBC1A}" type="datetimeFigureOut">
               <a:rPr lang="en-US" smtClean="0"/>
-              <a:t>12/26/25</a:t>
+              <a:t>1/8/26</a:t>
             </a:fld>
             <a:endParaRPr lang="en-US"/>
           </a:p>
@@ -3385,10 +3442,9 @@
           <a:lstStyle/>
           <a:p>
             <a:r>
-              <a:rPr lang="en-US" noProof="0" dirty="0" err="1"/>
-              <a:t>GeoPES</a:t>
-            </a:r>
-            <a:endParaRPr lang="en-US" noProof="0" dirty="0"/>
+              <a:rPr lang="en-US" noProof="0" dirty="0"/>
+              <a:t>…</a:t>
+            </a:r>
           </a:p>
         </p:txBody>
       </p:sp>
@@ -3969,7 +4025,7 @@
           <a:p>
             <a:r>
               <a:rPr lang="en-US" noProof="0" dirty="0"/>
-              <a:t>What do I get in return?</a:t>
+              <a:t>What do you get in return?</a:t>
             </a:r>
           </a:p>
         </p:txBody>
@@ -4047,16 +4103,13 @@
             </a:pPr>
             <a:r>
               <a:rPr lang="en-US" noProof="0" dirty="0"/>
-              <a:t>Added to the list of contributors for </a:t>
-            </a:r>
-            <a:r>
-              <a:rPr lang="en-US" noProof="0" dirty="0" err="1"/>
-              <a:t>GeoPES</a:t>
-            </a:r>
-            <a:r>
-              <a:rPr lang="en-US" noProof="0" dirty="0"/>
-              <a:t>.</a:t>
-            </a:r>
+              <a:t>Added to the list of contributors </a:t>
+            </a:r>
+            <a:r>
+              <a:rPr lang="en-US" noProof="0"/>
+              <a:t>for ….</a:t>
+            </a:r>
+            <a:endParaRPr lang="en-US" noProof="0" dirty="0"/>
           </a:p>
           <a:p>
             <a:pPr marL="514350" indent="-514350">

</xml_diff>